<commit_message>
update neural networks - 4
</commit_message>
<xml_diff>
--- a/_Neural_Networks/Neural_Networks - Projeto.pptx
+++ b/_Neural_Networks/Neural_Networks - Projeto.pptx
@@ -8,6 +8,7 @@
     <p:sldId id="259" r:id="rId2"/>
     <p:sldId id="258" r:id="rId3"/>
     <p:sldId id="260" r:id="rId4"/>
+    <p:sldId id="261" r:id="rId5"/>
   </p:sldIdLst>
   <p:sldSz cx="12192000" cy="6858000"/>
   <p:notesSz cx="6858000" cy="9144000"/>
@@ -3960,6 +3961,902 @@
 </p:sld>
 </file>
 
+<file path=ppt/slides/slide4.xml><?xml version="1.0" encoding="utf-8"?>
+<p:sld xmlns:a="http://schemas.openxmlformats.org/drawingml/2006/main" xmlns:r="http://schemas.openxmlformats.org/officeDocument/2006/relationships" xmlns:p="http://schemas.openxmlformats.org/presentationml/2006/main">
+  <p:cSld>
+    <p:spTree>
+      <p:nvGrpSpPr>
+        <p:cNvPr id="1" name=""/>
+        <p:cNvGrpSpPr/>
+        <p:nvPr/>
+      </p:nvGrpSpPr>
+      <p:grpSpPr>
+        <a:xfrm>
+          <a:off x="0" y="0"/>
+          <a:ext cx="0" cy="0"/>
+          <a:chOff x="0" y="0"/>
+          <a:chExt cx="0" cy="0"/>
+        </a:xfrm>
+      </p:grpSpPr>
+      <p:pic>
+        <p:nvPicPr>
+          <p:cNvPr id="3" name="Imagem 2">
+            <a:extLst>
+              <a:ext uri="{FF2B5EF4-FFF2-40B4-BE49-F238E27FC236}">
+                <a16:creationId xmlns:a16="http://schemas.microsoft.com/office/drawing/2014/main" id="{1F1BF814-9D8C-4096-AE25-FCB6BB9F5849}"/>
+              </a:ext>
+            </a:extLst>
+          </p:cNvPr>
+          <p:cNvPicPr>
+            <a:picLocks noChangeAspect="1"/>
+          </p:cNvPicPr>
+          <p:nvPr/>
+        </p:nvPicPr>
+        <p:blipFill>
+          <a:blip r:embed="rId2"/>
+          <a:stretch>
+            <a:fillRect/>
+          </a:stretch>
+        </p:blipFill>
+        <p:spPr>
+          <a:xfrm>
+            <a:off x="0" y="1234835"/>
+            <a:ext cx="12192000" cy="5496692"/>
+          </a:xfrm>
+          <a:prstGeom prst="rect">
+            <a:avLst/>
+          </a:prstGeom>
+        </p:spPr>
+      </p:pic>
+      <p:sp>
+        <p:nvSpPr>
+          <p:cNvPr id="4" name="Retângulo 3">
+            <a:extLst>
+              <a:ext uri="{FF2B5EF4-FFF2-40B4-BE49-F238E27FC236}">
+                <a16:creationId xmlns:a16="http://schemas.microsoft.com/office/drawing/2014/main" id="{8E0D7681-0C96-4FA9-A0CC-2B978A5EB96D}"/>
+              </a:ext>
+            </a:extLst>
+          </p:cNvPr>
+          <p:cNvSpPr/>
+          <p:nvPr/>
+        </p:nvSpPr>
+        <p:spPr>
+          <a:xfrm>
+            <a:off x="0" y="0"/>
+            <a:ext cx="12192000" cy="1371600"/>
+          </a:xfrm>
+          <a:prstGeom prst="rect">
+            <a:avLst/>
+          </a:prstGeom>
+          <a:solidFill>
+            <a:srgbClr val="05CB71"/>
+          </a:solidFill>
+        </p:spPr>
+        <p:style>
+          <a:lnRef idx="2">
+            <a:schemeClr val="accent1">
+              <a:shade val="50000"/>
+            </a:schemeClr>
+          </a:lnRef>
+          <a:fillRef idx="1">
+            <a:schemeClr val="accent1"/>
+          </a:fillRef>
+          <a:effectRef idx="0">
+            <a:schemeClr val="accent1"/>
+          </a:effectRef>
+          <a:fontRef idx="minor">
+            <a:schemeClr val="lt1"/>
+          </a:fontRef>
+        </p:style>
+        <p:txBody>
+          <a:bodyPr rtlCol="0" anchor="ctr"/>
+          <a:lstStyle/>
+          <a:p>
+            <a:pPr algn="ctr"/>
+            <a:r>
+              <a:rPr lang="pt-BR" sz="6600" b="1" dirty="0">
+                <a:effectLst>
+                  <a:outerShdw blurRad="38100" dist="38100" dir="2700000" algn="tl">
+                    <a:srgbClr val="000000">
+                      <a:alpha val="43137"/>
+                    </a:srgbClr>
+                  </a:outerShdw>
+                </a:effectLst>
+                <a:latin typeface="Tahoma" panose="020B0604030504040204" pitchFamily="34" charset="0"/>
+                <a:ea typeface="Tahoma" panose="020B0604030504040204" pitchFamily="34" charset="0"/>
+                <a:cs typeface="Tahoma" panose="020B0604030504040204" pitchFamily="34" charset="0"/>
+              </a:rPr>
+              <a:t>Artificial Neural Networks</a:t>
+            </a:r>
+          </a:p>
+        </p:txBody>
+      </p:sp>
+      <p:sp>
+        <p:nvSpPr>
+          <p:cNvPr id="5" name="CaixaDeTexto 4">
+            <a:extLst>
+              <a:ext uri="{FF2B5EF4-FFF2-40B4-BE49-F238E27FC236}">
+                <a16:creationId xmlns:a16="http://schemas.microsoft.com/office/drawing/2014/main" id="{EBF0E6F4-C1FB-4813-8FC0-943108E5F4AD}"/>
+              </a:ext>
+            </a:extLst>
+          </p:cNvPr>
+          <p:cNvSpPr txBox="1"/>
+          <p:nvPr/>
+        </p:nvSpPr>
+        <p:spPr>
+          <a:xfrm>
+            <a:off x="680852" y="1497611"/>
+            <a:ext cx="3091744" cy="830997"/>
+          </a:xfrm>
+          <a:prstGeom prst="rect">
+            <a:avLst/>
+          </a:prstGeom>
+          <a:noFill/>
+        </p:spPr>
+        <p:txBody>
+          <a:bodyPr wrap="none" rtlCol="0">
+            <a:spAutoFit/>
+          </a:bodyPr>
+          <a:lstStyle/>
+          <a:p>
+            <a:r>
+              <a:rPr lang="pt-BR" sz="2800" b="1" dirty="0">
+                <a:latin typeface="Tahoma" panose="020B0604030504040204" pitchFamily="34" charset="0"/>
+                <a:ea typeface="Tahoma" panose="020B0604030504040204" pitchFamily="34" charset="0"/>
+                <a:cs typeface="Tahoma" panose="020B0604030504040204" pitchFamily="34" charset="0"/>
+              </a:rPr>
+              <a:t>Sum </a:t>
+            </a:r>
+            <a:r>
+              <a:rPr lang="pt-BR" sz="2800" b="1" dirty="0" err="1">
+                <a:latin typeface="Tahoma" panose="020B0604030504040204" pitchFamily="34" charset="0"/>
+                <a:ea typeface="Tahoma" panose="020B0604030504040204" pitchFamily="34" charset="0"/>
+                <a:cs typeface="Tahoma" panose="020B0604030504040204" pitchFamily="34" charset="0"/>
+              </a:rPr>
+              <a:t>Function</a:t>
+            </a:r>
+            <a:endParaRPr lang="pt-BR" sz="2800" b="1" dirty="0">
+              <a:latin typeface="Tahoma" panose="020B0604030504040204" pitchFamily="34" charset="0"/>
+              <a:ea typeface="Tahoma" panose="020B0604030504040204" pitchFamily="34" charset="0"/>
+              <a:cs typeface="Tahoma" panose="020B0604030504040204" pitchFamily="34" charset="0"/>
+            </a:endParaRPr>
+          </a:p>
+          <a:p>
+            <a:pPr marL="342900" indent="-342900">
+              <a:buFont typeface="Arial" panose="020B0604020202020204" pitchFamily="34" charset="0"/>
+              <a:buChar char="•"/>
+            </a:pPr>
+            <a:r>
+              <a:rPr lang="pt-BR" sz="2000" dirty="0">
+                <a:latin typeface="Tahoma" panose="020B0604030504040204" pitchFamily="34" charset="0"/>
+                <a:ea typeface="Tahoma" panose="020B0604030504040204" pitchFamily="34" charset="0"/>
+                <a:cs typeface="Tahoma" panose="020B0604030504040204" pitchFamily="34" charset="0"/>
+              </a:rPr>
+              <a:t>Artificial </a:t>
+            </a:r>
+            <a:r>
+              <a:rPr lang="pt-BR" sz="2000" dirty="0" err="1">
+                <a:latin typeface="Tahoma" panose="020B0604030504040204" pitchFamily="34" charset="0"/>
+                <a:ea typeface="Tahoma" panose="020B0604030504040204" pitchFamily="34" charset="0"/>
+                <a:cs typeface="Tahoma" panose="020B0604030504040204" pitchFamily="34" charset="0"/>
+              </a:rPr>
+              <a:t>Neuron</a:t>
+            </a:r>
+            <a:r>
+              <a:rPr lang="pt-BR" sz="2000" dirty="0">
+                <a:latin typeface="Tahoma" panose="020B0604030504040204" pitchFamily="34" charset="0"/>
+                <a:ea typeface="Tahoma" panose="020B0604030504040204" pitchFamily="34" charset="0"/>
+                <a:cs typeface="Tahoma" panose="020B0604030504040204" pitchFamily="34" charset="0"/>
+              </a:rPr>
+              <a:t> Model</a:t>
+            </a:r>
+          </a:p>
+        </p:txBody>
+      </p:sp>
+      <p:sp>
+        <p:nvSpPr>
+          <p:cNvPr id="6" name="Retângulo 5">
+            <a:extLst>
+              <a:ext uri="{FF2B5EF4-FFF2-40B4-BE49-F238E27FC236}">
+                <a16:creationId xmlns:a16="http://schemas.microsoft.com/office/drawing/2014/main" id="{A527B96A-284F-4F40-B01E-F6A7CCF2D7F0}"/>
+              </a:ext>
+            </a:extLst>
+          </p:cNvPr>
+          <p:cNvSpPr/>
+          <p:nvPr/>
+        </p:nvSpPr>
+        <p:spPr>
+          <a:xfrm>
+            <a:off x="193964" y="2701636"/>
+            <a:ext cx="983672" cy="374073"/>
+          </a:xfrm>
+          <a:prstGeom prst="rect">
+            <a:avLst/>
+          </a:prstGeom>
+          <a:solidFill>
+            <a:srgbClr val="FFFFFF"/>
+          </a:solidFill>
+          <a:ln>
+            <a:noFill/>
+          </a:ln>
+        </p:spPr>
+        <p:style>
+          <a:lnRef idx="2">
+            <a:schemeClr val="accent1">
+              <a:shade val="50000"/>
+            </a:schemeClr>
+          </a:lnRef>
+          <a:fillRef idx="1">
+            <a:schemeClr val="accent1"/>
+          </a:fillRef>
+          <a:effectRef idx="0">
+            <a:schemeClr val="accent1"/>
+          </a:effectRef>
+          <a:fontRef idx="minor">
+            <a:schemeClr val="lt1"/>
+          </a:fontRef>
+        </p:style>
+        <p:txBody>
+          <a:bodyPr rtlCol="0" anchor="ctr"/>
+          <a:lstStyle/>
+          <a:p>
+            <a:pPr algn="ctr"/>
+            <a:endParaRPr lang="pt-BR"/>
+          </a:p>
+        </p:txBody>
+      </p:sp>
+      <p:sp>
+        <p:nvSpPr>
+          <p:cNvPr id="10" name="Retângulo 9">
+            <a:extLst>
+              <a:ext uri="{FF2B5EF4-FFF2-40B4-BE49-F238E27FC236}">
+                <a16:creationId xmlns:a16="http://schemas.microsoft.com/office/drawing/2014/main" id="{F9094FD0-18F3-4E25-9C30-548510639E00}"/>
+              </a:ext>
+            </a:extLst>
+          </p:cNvPr>
+          <p:cNvSpPr/>
+          <p:nvPr/>
+        </p:nvSpPr>
+        <p:spPr>
+          <a:xfrm>
+            <a:off x="1545772" y="3189370"/>
+            <a:ext cx="983672" cy="374073"/>
+          </a:xfrm>
+          <a:prstGeom prst="rect">
+            <a:avLst/>
+          </a:prstGeom>
+          <a:solidFill>
+            <a:srgbClr val="FFFFFF"/>
+          </a:solidFill>
+          <a:ln>
+            <a:noFill/>
+          </a:ln>
+        </p:spPr>
+        <p:style>
+          <a:lnRef idx="2">
+            <a:schemeClr val="accent1">
+              <a:shade val="50000"/>
+            </a:schemeClr>
+          </a:lnRef>
+          <a:fillRef idx="1">
+            <a:schemeClr val="accent1"/>
+          </a:fillRef>
+          <a:effectRef idx="0">
+            <a:schemeClr val="accent1"/>
+          </a:effectRef>
+          <a:fontRef idx="minor">
+            <a:schemeClr val="lt1"/>
+          </a:fontRef>
+        </p:style>
+        <p:txBody>
+          <a:bodyPr rtlCol="0" anchor="ctr"/>
+          <a:lstStyle/>
+          <a:p>
+            <a:pPr algn="ctr"/>
+            <a:endParaRPr lang="pt-BR"/>
+          </a:p>
+        </p:txBody>
+      </p:sp>
+      <p:sp>
+        <p:nvSpPr>
+          <p:cNvPr id="11" name="Retângulo 10">
+            <a:extLst>
+              <a:ext uri="{FF2B5EF4-FFF2-40B4-BE49-F238E27FC236}">
+                <a16:creationId xmlns:a16="http://schemas.microsoft.com/office/drawing/2014/main" id="{07E29EBF-7866-4B78-8586-7C05579F3265}"/>
+              </a:ext>
+            </a:extLst>
+          </p:cNvPr>
+          <p:cNvSpPr/>
+          <p:nvPr/>
+        </p:nvSpPr>
+        <p:spPr>
+          <a:xfrm>
+            <a:off x="4818743" y="5020379"/>
+            <a:ext cx="1277257" cy="374073"/>
+          </a:xfrm>
+          <a:prstGeom prst="rect">
+            <a:avLst/>
+          </a:prstGeom>
+          <a:solidFill>
+            <a:srgbClr val="FFFFFF"/>
+          </a:solidFill>
+          <a:ln>
+            <a:noFill/>
+          </a:ln>
+        </p:spPr>
+        <p:style>
+          <a:lnRef idx="2">
+            <a:schemeClr val="accent1">
+              <a:shade val="50000"/>
+            </a:schemeClr>
+          </a:lnRef>
+          <a:fillRef idx="1">
+            <a:schemeClr val="accent1"/>
+          </a:fillRef>
+          <a:effectRef idx="0">
+            <a:schemeClr val="accent1"/>
+          </a:effectRef>
+          <a:fontRef idx="minor">
+            <a:schemeClr val="lt1"/>
+          </a:fontRef>
+        </p:style>
+        <p:txBody>
+          <a:bodyPr rtlCol="0" anchor="ctr"/>
+          <a:lstStyle/>
+          <a:p>
+            <a:pPr algn="ctr"/>
+            <a:endParaRPr lang="pt-BR"/>
+          </a:p>
+        </p:txBody>
+      </p:sp>
+      <p:sp>
+        <p:nvSpPr>
+          <p:cNvPr id="12" name="CaixaDeTexto 11">
+            <a:extLst>
+              <a:ext uri="{FF2B5EF4-FFF2-40B4-BE49-F238E27FC236}">
+                <a16:creationId xmlns:a16="http://schemas.microsoft.com/office/drawing/2014/main" id="{B5671145-4667-4554-9FCA-2D638BFDA4EC}"/>
+              </a:ext>
+            </a:extLst>
+          </p:cNvPr>
+          <p:cNvSpPr txBox="1"/>
+          <p:nvPr/>
+        </p:nvSpPr>
+        <p:spPr>
+          <a:xfrm>
+            <a:off x="314982" y="2809395"/>
+            <a:ext cx="731739" cy="369332"/>
+          </a:xfrm>
+          <a:prstGeom prst="rect">
+            <a:avLst/>
+          </a:prstGeom>
+          <a:noFill/>
+        </p:spPr>
+        <p:txBody>
+          <a:bodyPr wrap="none" rtlCol="0">
+            <a:spAutoFit/>
+          </a:bodyPr>
+          <a:lstStyle/>
+          <a:p>
+            <a:r>
+              <a:rPr lang="pt-BR" dirty="0">
+                <a:latin typeface="Tahoma" panose="020B0604030504040204" pitchFamily="34" charset="0"/>
+                <a:ea typeface="Tahoma" panose="020B0604030504040204" pitchFamily="34" charset="0"/>
+                <a:cs typeface="Tahoma" panose="020B0604030504040204" pitchFamily="34" charset="0"/>
+              </a:rPr>
+              <a:t>Input</a:t>
+            </a:r>
+          </a:p>
+        </p:txBody>
+      </p:sp>
+      <p:sp>
+        <p:nvSpPr>
+          <p:cNvPr id="13" name="CaixaDeTexto 12">
+            <a:extLst>
+              <a:ext uri="{FF2B5EF4-FFF2-40B4-BE49-F238E27FC236}">
+                <a16:creationId xmlns:a16="http://schemas.microsoft.com/office/drawing/2014/main" id="{004BACBB-636E-47CB-AF45-2C43A3FF1366}"/>
+              </a:ext>
+            </a:extLst>
+          </p:cNvPr>
+          <p:cNvSpPr txBox="1"/>
+          <p:nvPr/>
+        </p:nvSpPr>
+        <p:spPr>
+          <a:xfrm>
+            <a:off x="1797705" y="3354804"/>
+            <a:ext cx="892617" cy="369332"/>
+          </a:xfrm>
+          <a:prstGeom prst="rect">
+            <a:avLst/>
+          </a:prstGeom>
+          <a:noFill/>
+        </p:spPr>
+        <p:txBody>
+          <a:bodyPr wrap="none" rtlCol="0">
+            <a:spAutoFit/>
+          </a:bodyPr>
+          <a:lstStyle/>
+          <a:p>
+            <a:r>
+              <a:rPr lang="pt-BR" dirty="0" err="1">
+                <a:latin typeface="Tahoma" panose="020B0604030504040204" pitchFamily="34" charset="0"/>
+                <a:ea typeface="Tahoma" panose="020B0604030504040204" pitchFamily="34" charset="0"/>
+                <a:cs typeface="Tahoma" panose="020B0604030504040204" pitchFamily="34" charset="0"/>
+              </a:rPr>
+              <a:t>Weight</a:t>
+            </a:r>
+            <a:endParaRPr lang="pt-BR" dirty="0">
+              <a:latin typeface="Tahoma" panose="020B0604030504040204" pitchFamily="34" charset="0"/>
+              <a:ea typeface="Tahoma" panose="020B0604030504040204" pitchFamily="34" charset="0"/>
+              <a:cs typeface="Tahoma" panose="020B0604030504040204" pitchFamily="34" charset="0"/>
+            </a:endParaRPr>
+          </a:p>
+        </p:txBody>
+      </p:sp>
+      <p:sp>
+        <p:nvSpPr>
+          <p:cNvPr id="15" name="Retângulo 14">
+            <a:extLst>
+              <a:ext uri="{FF2B5EF4-FFF2-40B4-BE49-F238E27FC236}">
+                <a16:creationId xmlns:a16="http://schemas.microsoft.com/office/drawing/2014/main" id="{7AE351DA-EC78-4447-BAE1-2CB0975E69B7}"/>
+              </a:ext>
+            </a:extLst>
+          </p:cNvPr>
+          <p:cNvSpPr/>
+          <p:nvPr/>
+        </p:nvSpPr>
+        <p:spPr>
+          <a:xfrm>
+            <a:off x="9749971" y="4553526"/>
+            <a:ext cx="2329543" cy="466853"/>
+          </a:xfrm>
+          <a:prstGeom prst="rect">
+            <a:avLst/>
+          </a:prstGeom>
+          <a:solidFill>
+            <a:srgbClr val="FFFFFF"/>
+          </a:solidFill>
+          <a:ln>
+            <a:noFill/>
+          </a:ln>
+        </p:spPr>
+        <p:style>
+          <a:lnRef idx="2">
+            <a:schemeClr val="accent1">
+              <a:shade val="50000"/>
+            </a:schemeClr>
+          </a:lnRef>
+          <a:fillRef idx="1">
+            <a:schemeClr val="accent1"/>
+          </a:fillRef>
+          <a:effectRef idx="0">
+            <a:schemeClr val="accent1"/>
+          </a:effectRef>
+          <a:fontRef idx="minor">
+            <a:schemeClr val="lt1"/>
+          </a:fontRef>
+        </p:style>
+        <p:txBody>
+          <a:bodyPr rtlCol="0" anchor="ctr"/>
+          <a:lstStyle/>
+          <a:p>
+            <a:pPr algn="ctr"/>
+            <a:endParaRPr lang="pt-BR"/>
+          </a:p>
+        </p:txBody>
+      </p:sp>
+      <p:sp>
+        <p:nvSpPr>
+          <p:cNvPr id="16" name="Retângulo 15">
+            <a:extLst>
+              <a:ext uri="{FF2B5EF4-FFF2-40B4-BE49-F238E27FC236}">
+                <a16:creationId xmlns:a16="http://schemas.microsoft.com/office/drawing/2014/main" id="{9C48825D-4F6D-4716-AC72-A2881DA98D8B}"/>
+              </a:ext>
+            </a:extLst>
+          </p:cNvPr>
+          <p:cNvSpPr/>
+          <p:nvPr/>
+        </p:nvSpPr>
+        <p:spPr>
+          <a:xfrm>
+            <a:off x="4648200" y="4553526"/>
+            <a:ext cx="2329543" cy="466853"/>
+          </a:xfrm>
+          <a:prstGeom prst="rect">
+            <a:avLst/>
+          </a:prstGeom>
+          <a:solidFill>
+            <a:srgbClr val="FFFFFF"/>
+          </a:solidFill>
+          <a:ln>
+            <a:noFill/>
+          </a:ln>
+        </p:spPr>
+        <p:style>
+          <a:lnRef idx="2">
+            <a:schemeClr val="accent1">
+              <a:shade val="50000"/>
+            </a:schemeClr>
+          </a:lnRef>
+          <a:fillRef idx="1">
+            <a:schemeClr val="accent1"/>
+          </a:fillRef>
+          <a:effectRef idx="0">
+            <a:schemeClr val="accent1"/>
+          </a:effectRef>
+          <a:fontRef idx="minor">
+            <a:schemeClr val="lt1"/>
+          </a:fontRef>
+        </p:style>
+        <p:txBody>
+          <a:bodyPr rtlCol="0" anchor="ctr"/>
+          <a:lstStyle/>
+          <a:p>
+            <a:pPr algn="ctr"/>
+            <a:endParaRPr lang="pt-BR"/>
+          </a:p>
+        </p:txBody>
+      </p:sp>
+      <p:sp>
+        <p:nvSpPr>
+          <p:cNvPr id="14" name="CaixaDeTexto 13">
+            <a:extLst>
+              <a:ext uri="{FF2B5EF4-FFF2-40B4-BE49-F238E27FC236}">
+                <a16:creationId xmlns:a16="http://schemas.microsoft.com/office/drawing/2014/main" id="{79AB0F90-7EAF-448D-AD2E-AE0CAC73504B}"/>
+              </a:ext>
+            </a:extLst>
+          </p:cNvPr>
+          <p:cNvSpPr txBox="1"/>
+          <p:nvPr/>
+        </p:nvSpPr>
+        <p:spPr>
+          <a:xfrm>
+            <a:off x="4648200" y="4553526"/>
+            <a:ext cx="1326004" cy="369332"/>
+          </a:xfrm>
+          <a:prstGeom prst="rect">
+            <a:avLst/>
+          </a:prstGeom>
+          <a:noFill/>
+        </p:spPr>
+        <p:txBody>
+          <a:bodyPr wrap="none" rtlCol="0">
+            <a:spAutoFit/>
+          </a:bodyPr>
+          <a:lstStyle/>
+          <a:p>
+            <a:r>
+              <a:rPr lang="pt-BR" dirty="0">
+                <a:latin typeface="Tahoma" panose="020B0604030504040204" pitchFamily="34" charset="0"/>
+                <a:ea typeface="Tahoma" panose="020B0604030504040204" pitchFamily="34" charset="0"/>
+                <a:cs typeface="Tahoma" panose="020B0604030504040204" pitchFamily="34" charset="0"/>
+              </a:rPr>
+              <a:t>Output = 1</a:t>
+            </a:r>
+          </a:p>
+        </p:txBody>
+      </p:sp>
+      <p:sp>
+        <p:nvSpPr>
+          <p:cNvPr id="17" name="Retângulo 16">
+            <a:extLst>
+              <a:ext uri="{FF2B5EF4-FFF2-40B4-BE49-F238E27FC236}">
+                <a16:creationId xmlns:a16="http://schemas.microsoft.com/office/drawing/2014/main" id="{4AA26FFD-C9E7-4CB4-9E7F-F34D0691E611}"/>
+              </a:ext>
+            </a:extLst>
+          </p:cNvPr>
+          <p:cNvSpPr/>
+          <p:nvPr/>
+        </p:nvSpPr>
+        <p:spPr>
+          <a:xfrm>
+            <a:off x="2607824" y="5124542"/>
+            <a:ext cx="1833547" cy="830997"/>
+          </a:xfrm>
+          <a:prstGeom prst="rect">
+            <a:avLst/>
+          </a:prstGeom>
+          <a:solidFill>
+            <a:srgbClr val="FFFFFF"/>
+          </a:solidFill>
+          <a:ln>
+            <a:noFill/>
+          </a:ln>
+        </p:spPr>
+        <p:style>
+          <a:lnRef idx="2">
+            <a:schemeClr val="accent1">
+              <a:shade val="50000"/>
+            </a:schemeClr>
+          </a:lnRef>
+          <a:fillRef idx="1">
+            <a:schemeClr val="accent1"/>
+          </a:fillRef>
+          <a:effectRef idx="0">
+            <a:schemeClr val="accent1"/>
+          </a:effectRef>
+          <a:fontRef idx="minor">
+            <a:schemeClr val="lt1"/>
+          </a:fontRef>
+        </p:style>
+        <p:txBody>
+          <a:bodyPr rtlCol="0" anchor="ctr"/>
+          <a:lstStyle/>
+          <a:p>
+            <a:pPr algn="ctr"/>
+            <a:endParaRPr lang="pt-BR"/>
+          </a:p>
+        </p:txBody>
+      </p:sp>
+      <p:sp>
+        <p:nvSpPr>
+          <p:cNvPr id="18" name="CaixaDeTexto 17">
+            <a:extLst>
+              <a:ext uri="{FF2B5EF4-FFF2-40B4-BE49-F238E27FC236}">
+                <a16:creationId xmlns:a16="http://schemas.microsoft.com/office/drawing/2014/main" id="{E7400555-1128-45EF-8F51-4D18A8360CBA}"/>
+              </a:ext>
+            </a:extLst>
+          </p:cNvPr>
+          <p:cNvSpPr txBox="1"/>
+          <p:nvPr/>
+        </p:nvSpPr>
+        <p:spPr>
+          <a:xfrm>
+            <a:off x="2607824" y="5207415"/>
+            <a:ext cx="857927" cy="523220"/>
+          </a:xfrm>
+          <a:prstGeom prst="rect">
+            <a:avLst/>
+          </a:prstGeom>
+          <a:noFill/>
+        </p:spPr>
+        <p:txBody>
+          <a:bodyPr wrap="none" rtlCol="0">
+            <a:spAutoFit/>
+          </a:bodyPr>
+          <a:lstStyle/>
+          <a:p>
+            <a:pPr algn="ctr"/>
+            <a:r>
+              <a:rPr lang="pt-BR" sz="1400" dirty="0">
+                <a:latin typeface="Tahoma" panose="020B0604030504040204" pitchFamily="34" charset="0"/>
+                <a:ea typeface="Tahoma" panose="020B0604030504040204" pitchFamily="34" charset="0"/>
+                <a:cs typeface="Tahoma" panose="020B0604030504040204" pitchFamily="34" charset="0"/>
+              </a:rPr>
+              <a:t>Sum </a:t>
+            </a:r>
+          </a:p>
+          <a:p>
+            <a:pPr algn="ctr"/>
+            <a:r>
+              <a:rPr lang="pt-BR" sz="1400" dirty="0" err="1">
+                <a:latin typeface="Tahoma" panose="020B0604030504040204" pitchFamily="34" charset="0"/>
+                <a:ea typeface="Tahoma" panose="020B0604030504040204" pitchFamily="34" charset="0"/>
+                <a:cs typeface="Tahoma" panose="020B0604030504040204" pitchFamily="34" charset="0"/>
+              </a:rPr>
+              <a:t>Function</a:t>
+            </a:r>
+            <a:endParaRPr lang="pt-BR" sz="1400" dirty="0">
+              <a:latin typeface="Tahoma" panose="020B0604030504040204" pitchFamily="34" charset="0"/>
+              <a:ea typeface="Tahoma" panose="020B0604030504040204" pitchFamily="34" charset="0"/>
+              <a:cs typeface="Tahoma" panose="020B0604030504040204" pitchFamily="34" charset="0"/>
+            </a:endParaRPr>
+          </a:p>
+        </p:txBody>
+      </p:sp>
+      <p:sp>
+        <p:nvSpPr>
+          <p:cNvPr id="19" name="CaixaDeTexto 18">
+            <a:extLst>
+              <a:ext uri="{FF2B5EF4-FFF2-40B4-BE49-F238E27FC236}">
+                <a16:creationId xmlns:a16="http://schemas.microsoft.com/office/drawing/2014/main" id="{06E4902B-35A8-4ADA-BE93-F8A791DA8BDC}"/>
+              </a:ext>
+            </a:extLst>
+          </p:cNvPr>
+          <p:cNvSpPr txBox="1"/>
+          <p:nvPr/>
+        </p:nvSpPr>
+        <p:spPr>
+          <a:xfrm>
+            <a:off x="3576096" y="5207415"/>
+            <a:ext cx="857927" cy="523220"/>
+          </a:xfrm>
+          <a:prstGeom prst="rect">
+            <a:avLst/>
+          </a:prstGeom>
+          <a:noFill/>
+        </p:spPr>
+        <p:txBody>
+          <a:bodyPr wrap="none" rtlCol="0">
+            <a:spAutoFit/>
+          </a:bodyPr>
+          <a:lstStyle/>
+          <a:p>
+            <a:pPr algn="ctr"/>
+            <a:r>
+              <a:rPr lang="pt-BR" sz="1400" dirty="0" err="1">
+                <a:latin typeface="Tahoma" panose="020B0604030504040204" pitchFamily="34" charset="0"/>
+                <a:ea typeface="Tahoma" panose="020B0604030504040204" pitchFamily="34" charset="0"/>
+                <a:cs typeface="Tahoma" panose="020B0604030504040204" pitchFamily="34" charset="0"/>
+              </a:rPr>
+              <a:t>Step</a:t>
+            </a:r>
+            <a:endParaRPr lang="pt-BR" sz="1400" dirty="0">
+              <a:latin typeface="Tahoma" panose="020B0604030504040204" pitchFamily="34" charset="0"/>
+              <a:ea typeface="Tahoma" panose="020B0604030504040204" pitchFamily="34" charset="0"/>
+              <a:cs typeface="Tahoma" panose="020B0604030504040204" pitchFamily="34" charset="0"/>
+            </a:endParaRPr>
+          </a:p>
+          <a:p>
+            <a:pPr algn="ctr"/>
+            <a:r>
+              <a:rPr lang="pt-BR" sz="1400" dirty="0" err="1">
+                <a:latin typeface="Tahoma" panose="020B0604030504040204" pitchFamily="34" charset="0"/>
+                <a:ea typeface="Tahoma" panose="020B0604030504040204" pitchFamily="34" charset="0"/>
+                <a:cs typeface="Tahoma" panose="020B0604030504040204" pitchFamily="34" charset="0"/>
+              </a:rPr>
+              <a:t>Function</a:t>
+            </a:r>
+            <a:endParaRPr lang="pt-BR" sz="1400" dirty="0">
+              <a:latin typeface="Tahoma" panose="020B0604030504040204" pitchFamily="34" charset="0"/>
+              <a:ea typeface="Tahoma" panose="020B0604030504040204" pitchFamily="34" charset="0"/>
+              <a:cs typeface="Tahoma" panose="020B0604030504040204" pitchFamily="34" charset="0"/>
+            </a:endParaRPr>
+          </a:p>
+        </p:txBody>
+      </p:sp>
+      <p:sp>
+        <p:nvSpPr>
+          <p:cNvPr id="21" name="Retângulo 20">
+            <a:extLst>
+              <a:ext uri="{FF2B5EF4-FFF2-40B4-BE49-F238E27FC236}">
+                <a16:creationId xmlns:a16="http://schemas.microsoft.com/office/drawing/2014/main" id="{3C8FA7D4-EE8E-45FD-81C8-0317BF69C29F}"/>
+              </a:ext>
+            </a:extLst>
+          </p:cNvPr>
+          <p:cNvSpPr/>
+          <p:nvPr/>
+        </p:nvSpPr>
+        <p:spPr>
+          <a:xfrm>
+            <a:off x="7788492" y="5175673"/>
+            <a:ext cx="3314937" cy="738664"/>
+          </a:xfrm>
+          <a:prstGeom prst="rect">
+            <a:avLst/>
+          </a:prstGeom>
+          <a:solidFill>
+            <a:srgbClr val="FFFFFF"/>
+          </a:solidFill>
+          <a:ln>
+            <a:noFill/>
+          </a:ln>
+        </p:spPr>
+        <p:style>
+          <a:lnRef idx="2">
+            <a:schemeClr val="accent1">
+              <a:shade val="50000"/>
+            </a:schemeClr>
+          </a:lnRef>
+          <a:fillRef idx="1">
+            <a:schemeClr val="accent1"/>
+          </a:fillRef>
+          <a:effectRef idx="0">
+            <a:schemeClr val="accent1"/>
+          </a:effectRef>
+          <a:fontRef idx="minor">
+            <a:schemeClr val="lt1"/>
+          </a:fontRef>
+        </p:style>
+        <p:txBody>
+          <a:bodyPr rtlCol="0" anchor="ctr"/>
+          <a:lstStyle/>
+          <a:p>
+            <a:pPr algn="ctr"/>
+            <a:endParaRPr lang="pt-BR"/>
+          </a:p>
+        </p:txBody>
+      </p:sp>
+      <p:sp>
+        <p:nvSpPr>
+          <p:cNvPr id="20" name="CaixaDeTexto 19">
+            <a:extLst>
+              <a:ext uri="{FF2B5EF4-FFF2-40B4-BE49-F238E27FC236}">
+                <a16:creationId xmlns:a16="http://schemas.microsoft.com/office/drawing/2014/main" id="{D13E106D-A2E0-4436-A888-E9400FEC40EF}"/>
+              </a:ext>
+            </a:extLst>
+          </p:cNvPr>
+          <p:cNvSpPr txBox="1"/>
+          <p:nvPr/>
+        </p:nvSpPr>
+        <p:spPr>
+          <a:xfrm>
+            <a:off x="8210836" y="5052067"/>
+            <a:ext cx="1314784" cy="738664"/>
+          </a:xfrm>
+          <a:prstGeom prst="rect">
+            <a:avLst/>
+          </a:prstGeom>
+          <a:noFill/>
+        </p:spPr>
+        <p:txBody>
+          <a:bodyPr wrap="none" rtlCol="0">
+            <a:spAutoFit/>
+          </a:bodyPr>
+          <a:lstStyle/>
+          <a:p>
+            <a:r>
+              <a:rPr lang="pt-BR" sz="1400" dirty="0">
+                <a:latin typeface="Tahoma" panose="020B0604030504040204" pitchFamily="34" charset="0"/>
+                <a:ea typeface="Tahoma" panose="020B0604030504040204" pitchFamily="34" charset="0"/>
+                <a:cs typeface="Tahoma" panose="020B0604030504040204" pitchFamily="34" charset="0"/>
+              </a:rPr>
+              <a:t>(</a:t>
+            </a:r>
+            <a:r>
+              <a:rPr lang="pt-BR" sz="1400" dirty="0" err="1">
+                <a:latin typeface="Tahoma" panose="020B0604030504040204" pitchFamily="34" charset="0"/>
+                <a:ea typeface="Tahoma" panose="020B0604030504040204" pitchFamily="34" charset="0"/>
+                <a:cs typeface="Tahoma" panose="020B0604030504040204" pitchFamily="34" charset="0"/>
+              </a:rPr>
+              <a:t>If</a:t>
+            </a:r>
+            <a:r>
+              <a:rPr lang="pt-BR" sz="1400" dirty="0">
+                <a:latin typeface="Tahoma" panose="020B0604030504040204" pitchFamily="34" charset="0"/>
+                <a:ea typeface="Tahoma" panose="020B0604030504040204" pitchFamily="34" charset="0"/>
+                <a:cs typeface="Tahoma" panose="020B0604030504040204" pitchFamily="34" charset="0"/>
+              </a:rPr>
+              <a:t> f &gt; 0) =  1</a:t>
+            </a:r>
+          </a:p>
+          <a:p>
+            <a:endParaRPr lang="pt-BR" sz="1400" dirty="0">
+              <a:latin typeface="Tahoma" panose="020B0604030504040204" pitchFamily="34" charset="0"/>
+              <a:ea typeface="Tahoma" panose="020B0604030504040204" pitchFamily="34" charset="0"/>
+              <a:cs typeface="Tahoma" panose="020B0604030504040204" pitchFamily="34" charset="0"/>
+            </a:endParaRPr>
+          </a:p>
+          <a:p>
+            <a:r>
+              <a:rPr lang="pt-BR" sz="1400" dirty="0">
+                <a:latin typeface="Tahoma" panose="020B0604030504040204" pitchFamily="34" charset="0"/>
+                <a:ea typeface="Tahoma" panose="020B0604030504040204" pitchFamily="34" charset="0"/>
+                <a:cs typeface="Tahoma" panose="020B0604030504040204" pitchFamily="34" charset="0"/>
+              </a:rPr>
+              <a:t>(</a:t>
+            </a:r>
+            <a:r>
+              <a:rPr lang="pt-BR" sz="1400" dirty="0" err="1">
+                <a:latin typeface="Tahoma" panose="020B0604030504040204" pitchFamily="34" charset="0"/>
+                <a:ea typeface="Tahoma" panose="020B0604030504040204" pitchFamily="34" charset="0"/>
+                <a:cs typeface="Tahoma" panose="020B0604030504040204" pitchFamily="34" charset="0"/>
+              </a:rPr>
+              <a:t>If</a:t>
+            </a:r>
+            <a:r>
+              <a:rPr lang="pt-BR" sz="1400" dirty="0">
+                <a:latin typeface="Tahoma" panose="020B0604030504040204" pitchFamily="34" charset="0"/>
+                <a:ea typeface="Tahoma" panose="020B0604030504040204" pitchFamily="34" charset="0"/>
+                <a:cs typeface="Tahoma" panose="020B0604030504040204" pitchFamily="34" charset="0"/>
+              </a:rPr>
+              <a:t> f =&lt;0) = 0</a:t>
+            </a:r>
+          </a:p>
+        </p:txBody>
+      </p:sp>
+    </p:spTree>
+    <p:extLst>
+      <p:ext uri="{BB962C8B-B14F-4D97-AF65-F5344CB8AC3E}">
+        <p14:creationId xmlns:p14="http://schemas.microsoft.com/office/powerpoint/2010/main" val="3573356120"/>
+      </p:ext>
+    </p:extLst>
+  </p:cSld>
+  <p:clrMapOvr>
+    <a:masterClrMapping/>
+  </p:clrMapOvr>
+</p:sld>
+</file>
+
 <file path=ppt/theme/theme1.xml><?xml version="1.0" encoding="utf-8"?>
 <a:theme xmlns:a="http://schemas.openxmlformats.org/drawingml/2006/main" name="Tema do Office">
   <a:themeElements>

</xml_diff>

<commit_message>
update neural networks - 5
</commit_message>
<xml_diff>
--- a/_Neural_Networks/Neural_Networks - Projeto.pptx
+++ b/_Neural_Networks/Neural_Networks - Projeto.pptx
@@ -9,6 +9,7 @@
     <p:sldId id="258" r:id="rId3"/>
     <p:sldId id="260" r:id="rId4"/>
     <p:sldId id="261" r:id="rId5"/>
+    <p:sldId id="262" r:id="rId6"/>
   </p:sldIdLst>
   <p:sldSz cx="12192000" cy="6858000"/>
   <p:notesSz cx="6858000" cy="9144000"/>
@@ -4086,7 +4087,7 @@
         <p:spPr>
           <a:xfrm>
             <a:off x="680852" y="1497611"/>
-            <a:ext cx="3091744" cy="830997"/>
+            <a:ext cx="2654894" cy="523220"/>
           </a:xfrm>
           <a:prstGeom prst="rect">
             <a:avLst/>
@@ -4120,36 +4121,6 @@
               <a:ea typeface="Tahoma" panose="020B0604030504040204" pitchFamily="34" charset="0"/>
               <a:cs typeface="Tahoma" panose="020B0604030504040204" pitchFamily="34" charset="0"/>
             </a:endParaRPr>
-          </a:p>
-          <a:p>
-            <a:pPr marL="342900" indent="-342900">
-              <a:buFont typeface="Arial" panose="020B0604020202020204" pitchFamily="34" charset="0"/>
-              <a:buChar char="•"/>
-            </a:pPr>
-            <a:r>
-              <a:rPr lang="pt-BR" sz="2000" dirty="0">
-                <a:latin typeface="Tahoma" panose="020B0604030504040204" pitchFamily="34" charset="0"/>
-                <a:ea typeface="Tahoma" panose="020B0604030504040204" pitchFamily="34" charset="0"/>
-                <a:cs typeface="Tahoma" panose="020B0604030504040204" pitchFamily="34" charset="0"/>
-              </a:rPr>
-              <a:t>Artificial </a:t>
-            </a:r>
-            <a:r>
-              <a:rPr lang="pt-BR" sz="2000" dirty="0" err="1">
-                <a:latin typeface="Tahoma" panose="020B0604030504040204" pitchFamily="34" charset="0"/>
-                <a:ea typeface="Tahoma" panose="020B0604030504040204" pitchFamily="34" charset="0"/>
-                <a:cs typeface="Tahoma" panose="020B0604030504040204" pitchFamily="34" charset="0"/>
-              </a:rPr>
-              <a:t>Neuron</a:t>
-            </a:r>
-            <a:r>
-              <a:rPr lang="pt-BR" sz="2000" dirty="0">
-                <a:latin typeface="Tahoma" panose="020B0604030504040204" pitchFamily="34" charset="0"/>
-                <a:ea typeface="Tahoma" panose="020B0604030504040204" pitchFamily="34" charset="0"/>
-                <a:cs typeface="Tahoma" panose="020B0604030504040204" pitchFamily="34" charset="0"/>
-              </a:rPr>
-              <a:t> Model</a:t>
-            </a:r>
           </a:p>
         </p:txBody>
       </p:sp>
@@ -4394,10 +4365,10 @@
       </p:sp>
       <p:sp>
         <p:nvSpPr>
-          <p:cNvPr id="15" name="Retângulo 14">
-            <a:extLst>
-              <a:ext uri="{FF2B5EF4-FFF2-40B4-BE49-F238E27FC236}">
-                <a16:creationId xmlns:a16="http://schemas.microsoft.com/office/drawing/2014/main" id="{7AE351DA-EC78-4447-BAE1-2CB0975E69B7}"/>
+          <p:cNvPr id="16" name="Retângulo 15">
+            <a:extLst>
+              <a:ext uri="{FF2B5EF4-FFF2-40B4-BE49-F238E27FC236}">
+                <a16:creationId xmlns:a16="http://schemas.microsoft.com/office/drawing/2014/main" id="{9C48825D-4F6D-4716-AC72-A2881DA98D8B}"/>
               </a:ext>
             </a:extLst>
           </p:cNvPr>
@@ -4406,7 +4377,7 @@
         </p:nvSpPr>
         <p:spPr>
           <a:xfrm>
-            <a:off x="9749971" y="4553526"/>
+            <a:off x="4648200" y="4553526"/>
             <a:ext cx="2329543" cy="466853"/>
           </a:xfrm>
           <a:prstGeom prst="rect">
@@ -4446,10 +4417,49 @@
       </p:sp>
       <p:sp>
         <p:nvSpPr>
-          <p:cNvPr id="16" name="Retângulo 15">
-            <a:extLst>
-              <a:ext uri="{FF2B5EF4-FFF2-40B4-BE49-F238E27FC236}">
-                <a16:creationId xmlns:a16="http://schemas.microsoft.com/office/drawing/2014/main" id="{9C48825D-4F6D-4716-AC72-A2881DA98D8B}"/>
+          <p:cNvPr id="14" name="CaixaDeTexto 13">
+            <a:extLst>
+              <a:ext uri="{FF2B5EF4-FFF2-40B4-BE49-F238E27FC236}">
+                <a16:creationId xmlns:a16="http://schemas.microsoft.com/office/drawing/2014/main" id="{79AB0F90-7EAF-448D-AD2E-AE0CAC73504B}"/>
+              </a:ext>
+            </a:extLst>
+          </p:cNvPr>
+          <p:cNvSpPr txBox="1"/>
+          <p:nvPr/>
+        </p:nvSpPr>
+        <p:spPr>
+          <a:xfrm>
+            <a:off x="4648200" y="4553526"/>
+            <a:ext cx="1326004" cy="369332"/>
+          </a:xfrm>
+          <a:prstGeom prst="rect">
+            <a:avLst/>
+          </a:prstGeom>
+          <a:noFill/>
+        </p:spPr>
+        <p:txBody>
+          <a:bodyPr wrap="none" rtlCol="0">
+            <a:spAutoFit/>
+          </a:bodyPr>
+          <a:lstStyle/>
+          <a:p>
+            <a:r>
+              <a:rPr lang="pt-BR" dirty="0">
+                <a:latin typeface="Tahoma" panose="020B0604030504040204" pitchFamily="34" charset="0"/>
+                <a:ea typeface="Tahoma" panose="020B0604030504040204" pitchFamily="34" charset="0"/>
+                <a:cs typeface="Tahoma" panose="020B0604030504040204" pitchFamily="34" charset="0"/>
+              </a:rPr>
+              <a:t>Output = 1</a:t>
+            </a:r>
+          </a:p>
+        </p:txBody>
+      </p:sp>
+      <p:sp>
+        <p:nvSpPr>
+          <p:cNvPr id="17" name="Retângulo 16">
+            <a:extLst>
+              <a:ext uri="{FF2B5EF4-FFF2-40B4-BE49-F238E27FC236}">
+                <a16:creationId xmlns:a16="http://schemas.microsoft.com/office/drawing/2014/main" id="{4AA26FFD-C9E7-4CB4-9E7F-F34D0691E611}"/>
               </a:ext>
             </a:extLst>
           </p:cNvPr>
@@ -4458,8 +4468,8 @@
         </p:nvSpPr>
         <p:spPr>
           <a:xfrm>
-            <a:off x="4648200" y="4553526"/>
-            <a:ext cx="2329543" cy="466853"/>
+            <a:off x="2607824" y="5124542"/>
+            <a:ext cx="1833547" cy="830997"/>
           </a:xfrm>
           <a:prstGeom prst="rect">
             <a:avLst/>
@@ -4498,10 +4508,10 @@
       </p:sp>
       <p:sp>
         <p:nvSpPr>
-          <p:cNvPr id="14" name="CaixaDeTexto 13">
-            <a:extLst>
-              <a:ext uri="{FF2B5EF4-FFF2-40B4-BE49-F238E27FC236}">
-                <a16:creationId xmlns:a16="http://schemas.microsoft.com/office/drawing/2014/main" id="{79AB0F90-7EAF-448D-AD2E-AE0CAC73504B}"/>
+          <p:cNvPr id="18" name="CaixaDeTexto 17">
+            <a:extLst>
+              <a:ext uri="{FF2B5EF4-FFF2-40B4-BE49-F238E27FC236}">
+                <a16:creationId xmlns:a16="http://schemas.microsoft.com/office/drawing/2014/main" id="{E7400555-1128-45EF-8F51-4D18A8360CBA}"/>
               </a:ext>
             </a:extLst>
           </p:cNvPr>
@@ -4510,8 +4520,8 @@
         </p:nvSpPr>
         <p:spPr>
           <a:xfrm>
-            <a:off x="4648200" y="4553526"/>
-            <a:ext cx="1326004" cy="369332"/>
+            <a:off x="2607824" y="5207415"/>
+            <a:ext cx="857927" cy="523220"/>
           </a:xfrm>
           <a:prstGeom prst="rect">
             <a:avLst/>
@@ -4524,23 +4534,101 @@
           </a:bodyPr>
           <a:lstStyle/>
           <a:p>
-            <a:r>
-              <a:rPr lang="pt-BR" dirty="0">
+            <a:pPr algn="ctr"/>
+            <a:r>
+              <a:rPr lang="pt-BR" sz="1400" dirty="0">
                 <a:latin typeface="Tahoma" panose="020B0604030504040204" pitchFamily="34" charset="0"/>
                 <a:ea typeface="Tahoma" panose="020B0604030504040204" pitchFamily="34" charset="0"/>
                 <a:cs typeface="Tahoma" panose="020B0604030504040204" pitchFamily="34" charset="0"/>
               </a:rPr>
-              <a:t>Output = 1</a:t>
-            </a:r>
-          </a:p>
-        </p:txBody>
-      </p:sp>
-      <p:sp>
-        <p:nvSpPr>
-          <p:cNvPr id="17" name="Retângulo 16">
-            <a:extLst>
-              <a:ext uri="{FF2B5EF4-FFF2-40B4-BE49-F238E27FC236}">
-                <a16:creationId xmlns:a16="http://schemas.microsoft.com/office/drawing/2014/main" id="{4AA26FFD-C9E7-4CB4-9E7F-F34D0691E611}"/>
+              <a:t>Sum </a:t>
+            </a:r>
+          </a:p>
+          <a:p>
+            <a:pPr algn="ctr"/>
+            <a:r>
+              <a:rPr lang="pt-BR" sz="1400" dirty="0" err="1">
+                <a:latin typeface="Tahoma" panose="020B0604030504040204" pitchFamily="34" charset="0"/>
+                <a:ea typeface="Tahoma" panose="020B0604030504040204" pitchFamily="34" charset="0"/>
+                <a:cs typeface="Tahoma" panose="020B0604030504040204" pitchFamily="34" charset="0"/>
+              </a:rPr>
+              <a:t>Function</a:t>
+            </a:r>
+            <a:endParaRPr lang="pt-BR" sz="1400" dirty="0">
+              <a:latin typeface="Tahoma" panose="020B0604030504040204" pitchFamily="34" charset="0"/>
+              <a:ea typeface="Tahoma" panose="020B0604030504040204" pitchFamily="34" charset="0"/>
+              <a:cs typeface="Tahoma" panose="020B0604030504040204" pitchFamily="34" charset="0"/>
+            </a:endParaRPr>
+          </a:p>
+        </p:txBody>
+      </p:sp>
+      <p:sp>
+        <p:nvSpPr>
+          <p:cNvPr id="19" name="CaixaDeTexto 18">
+            <a:extLst>
+              <a:ext uri="{FF2B5EF4-FFF2-40B4-BE49-F238E27FC236}">
+                <a16:creationId xmlns:a16="http://schemas.microsoft.com/office/drawing/2014/main" id="{06E4902B-35A8-4ADA-BE93-F8A791DA8BDC}"/>
+              </a:ext>
+            </a:extLst>
+          </p:cNvPr>
+          <p:cNvSpPr txBox="1"/>
+          <p:nvPr/>
+        </p:nvSpPr>
+        <p:spPr>
+          <a:xfrm>
+            <a:off x="3576096" y="5207415"/>
+            <a:ext cx="857927" cy="523220"/>
+          </a:xfrm>
+          <a:prstGeom prst="rect">
+            <a:avLst/>
+          </a:prstGeom>
+          <a:noFill/>
+        </p:spPr>
+        <p:txBody>
+          <a:bodyPr wrap="none" rtlCol="0">
+            <a:spAutoFit/>
+          </a:bodyPr>
+          <a:lstStyle/>
+          <a:p>
+            <a:pPr algn="ctr"/>
+            <a:r>
+              <a:rPr lang="pt-BR" sz="1400" dirty="0" err="1">
+                <a:latin typeface="Tahoma" panose="020B0604030504040204" pitchFamily="34" charset="0"/>
+                <a:ea typeface="Tahoma" panose="020B0604030504040204" pitchFamily="34" charset="0"/>
+                <a:cs typeface="Tahoma" panose="020B0604030504040204" pitchFamily="34" charset="0"/>
+              </a:rPr>
+              <a:t>Step</a:t>
+            </a:r>
+            <a:endParaRPr lang="pt-BR" sz="1400" dirty="0">
+              <a:latin typeface="Tahoma" panose="020B0604030504040204" pitchFamily="34" charset="0"/>
+              <a:ea typeface="Tahoma" panose="020B0604030504040204" pitchFamily="34" charset="0"/>
+              <a:cs typeface="Tahoma" panose="020B0604030504040204" pitchFamily="34" charset="0"/>
+            </a:endParaRPr>
+          </a:p>
+          <a:p>
+            <a:pPr algn="ctr"/>
+            <a:r>
+              <a:rPr lang="pt-BR" sz="1400" dirty="0" err="1">
+                <a:latin typeface="Tahoma" panose="020B0604030504040204" pitchFamily="34" charset="0"/>
+                <a:ea typeface="Tahoma" panose="020B0604030504040204" pitchFamily="34" charset="0"/>
+                <a:cs typeface="Tahoma" panose="020B0604030504040204" pitchFamily="34" charset="0"/>
+              </a:rPr>
+              <a:t>Function</a:t>
+            </a:r>
+            <a:endParaRPr lang="pt-BR" sz="1400" dirty="0">
+              <a:latin typeface="Tahoma" panose="020B0604030504040204" pitchFamily="34" charset="0"/>
+              <a:ea typeface="Tahoma" panose="020B0604030504040204" pitchFamily="34" charset="0"/>
+              <a:cs typeface="Tahoma" panose="020B0604030504040204" pitchFamily="34" charset="0"/>
+            </a:endParaRPr>
+          </a:p>
+        </p:txBody>
+      </p:sp>
+      <p:sp>
+        <p:nvSpPr>
+          <p:cNvPr id="21" name="Retângulo 20">
+            <a:extLst>
+              <a:ext uri="{FF2B5EF4-FFF2-40B4-BE49-F238E27FC236}">
+                <a16:creationId xmlns:a16="http://schemas.microsoft.com/office/drawing/2014/main" id="{3C8FA7D4-EE8E-45FD-81C8-0317BF69C29F}"/>
               </a:ext>
             </a:extLst>
           </p:cNvPr>
@@ -4549,8 +4637,8 @@
         </p:nvSpPr>
         <p:spPr>
           <a:xfrm>
-            <a:off x="2607824" y="5124542"/>
-            <a:ext cx="1833547" cy="830997"/>
+            <a:off x="7788492" y="5175673"/>
+            <a:ext cx="3314937" cy="738664"/>
           </a:xfrm>
           <a:prstGeom prst="rect">
             <a:avLst/>
@@ -4589,10 +4677,10 @@
       </p:sp>
       <p:sp>
         <p:nvSpPr>
-          <p:cNvPr id="18" name="CaixaDeTexto 17">
-            <a:extLst>
-              <a:ext uri="{FF2B5EF4-FFF2-40B4-BE49-F238E27FC236}">
-                <a16:creationId xmlns:a16="http://schemas.microsoft.com/office/drawing/2014/main" id="{E7400555-1128-45EF-8F51-4D18A8360CBA}"/>
+          <p:cNvPr id="20" name="CaixaDeTexto 19">
+            <a:extLst>
+              <a:ext uri="{FF2B5EF4-FFF2-40B4-BE49-F238E27FC236}">
+                <a16:creationId xmlns:a16="http://schemas.microsoft.com/office/drawing/2014/main" id="{D13E106D-A2E0-4436-A888-E9400FEC40EF}"/>
               </a:ext>
             </a:extLst>
           </p:cNvPr>
@@ -4601,8 +4689,8 @@
         </p:nvSpPr>
         <p:spPr>
           <a:xfrm>
-            <a:off x="2607824" y="5207415"/>
-            <a:ext cx="857927" cy="523220"/>
+            <a:off x="8210836" y="5052067"/>
+            <a:ext cx="1314784" cy="738664"/>
           </a:xfrm>
           <a:prstGeom prst="rect">
             <a:avLst/>
@@ -4615,101 +4703,72 @@
           </a:bodyPr>
           <a:lstStyle/>
           <a:p>
-            <a:pPr algn="ctr"/>
             <a:r>
               <a:rPr lang="pt-BR" sz="1400" dirty="0">
                 <a:latin typeface="Tahoma" panose="020B0604030504040204" pitchFamily="34" charset="0"/>
                 <a:ea typeface="Tahoma" panose="020B0604030504040204" pitchFamily="34" charset="0"/>
                 <a:cs typeface="Tahoma" panose="020B0604030504040204" pitchFamily="34" charset="0"/>
               </a:rPr>
-              <a:t>Sum </a:t>
-            </a:r>
-          </a:p>
-          <a:p>
-            <a:pPr algn="ctr"/>
+              <a:t>(</a:t>
+            </a:r>
             <a:r>
               <a:rPr lang="pt-BR" sz="1400" dirty="0" err="1">
                 <a:latin typeface="Tahoma" panose="020B0604030504040204" pitchFamily="34" charset="0"/>
                 <a:ea typeface="Tahoma" panose="020B0604030504040204" pitchFamily="34" charset="0"/>
                 <a:cs typeface="Tahoma" panose="020B0604030504040204" pitchFamily="34" charset="0"/>
               </a:rPr>
-              <a:t>Function</a:t>
-            </a:r>
+              <a:t>If</a:t>
+            </a:r>
+            <a:r>
+              <a:rPr lang="pt-BR" sz="1400" dirty="0">
+                <a:latin typeface="Tahoma" panose="020B0604030504040204" pitchFamily="34" charset="0"/>
+                <a:ea typeface="Tahoma" panose="020B0604030504040204" pitchFamily="34" charset="0"/>
+                <a:cs typeface="Tahoma" panose="020B0604030504040204" pitchFamily="34" charset="0"/>
+              </a:rPr>
+              <a:t> f &gt; 0) =  1</a:t>
+            </a:r>
+          </a:p>
+          <a:p>
             <a:endParaRPr lang="pt-BR" sz="1400" dirty="0">
               <a:latin typeface="Tahoma" panose="020B0604030504040204" pitchFamily="34" charset="0"/>
               <a:ea typeface="Tahoma" panose="020B0604030504040204" pitchFamily="34" charset="0"/>
               <a:cs typeface="Tahoma" panose="020B0604030504040204" pitchFamily="34" charset="0"/>
             </a:endParaRPr>
           </a:p>
-        </p:txBody>
-      </p:sp>
-      <p:sp>
-        <p:nvSpPr>
-          <p:cNvPr id="19" name="CaixaDeTexto 18">
-            <a:extLst>
-              <a:ext uri="{FF2B5EF4-FFF2-40B4-BE49-F238E27FC236}">
-                <a16:creationId xmlns:a16="http://schemas.microsoft.com/office/drawing/2014/main" id="{06E4902B-35A8-4ADA-BE93-F8A791DA8BDC}"/>
-              </a:ext>
-            </a:extLst>
-          </p:cNvPr>
-          <p:cNvSpPr txBox="1"/>
-          <p:nvPr/>
-        </p:nvSpPr>
-        <p:spPr>
-          <a:xfrm>
-            <a:off x="3576096" y="5207415"/>
-            <a:ext cx="857927" cy="523220"/>
-          </a:xfrm>
-          <a:prstGeom prst="rect">
-            <a:avLst/>
-          </a:prstGeom>
-          <a:noFill/>
-        </p:spPr>
-        <p:txBody>
-          <a:bodyPr wrap="none" rtlCol="0">
-            <a:spAutoFit/>
-          </a:bodyPr>
-          <a:lstStyle/>
-          <a:p>
-            <a:pPr algn="ctr"/>
+          <a:p>
+            <a:r>
+              <a:rPr lang="pt-BR" sz="1400" dirty="0">
+                <a:latin typeface="Tahoma" panose="020B0604030504040204" pitchFamily="34" charset="0"/>
+                <a:ea typeface="Tahoma" panose="020B0604030504040204" pitchFamily="34" charset="0"/>
+                <a:cs typeface="Tahoma" panose="020B0604030504040204" pitchFamily="34" charset="0"/>
+              </a:rPr>
+              <a:t>(</a:t>
+            </a:r>
             <a:r>
               <a:rPr lang="pt-BR" sz="1400" dirty="0" err="1">
                 <a:latin typeface="Tahoma" panose="020B0604030504040204" pitchFamily="34" charset="0"/>
                 <a:ea typeface="Tahoma" panose="020B0604030504040204" pitchFamily="34" charset="0"/>
                 <a:cs typeface="Tahoma" panose="020B0604030504040204" pitchFamily="34" charset="0"/>
               </a:rPr>
-              <a:t>Step</a:t>
-            </a:r>
-            <a:endParaRPr lang="pt-BR" sz="1400" dirty="0">
-              <a:latin typeface="Tahoma" panose="020B0604030504040204" pitchFamily="34" charset="0"/>
-              <a:ea typeface="Tahoma" panose="020B0604030504040204" pitchFamily="34" charset="0"/>
-              <a:cs typeface="Tahoma" panose="020B0604030504040204" pitchFamily="34" charset="0"/>
-            </a:endParaRPr>
-          </a:p>
-          <a:p>
-            <a:pPr algn="ctr"/>
-            <a:r>
-              <a:rPr lang="pt-BR" sz="1400" dirty="0" err="1">
+              <a:t>If</a:t>
+            </a:r>
+            <a:r>
+              <a:rPr lang="pt-BR" sz="1400" dirty="0">
                 <a:latin typeface="Tahoma" panose="020B0604030504040204" pitchFamily="34" charset="0"/>
                 <a:ea typeface="Tahoma" panose="020B0604030504040204" pitchFamily="34" charset="0"/>
                 <a:cs typeface="Tahoma" panose="020B0604030504040204" pitchFamily="34" charset="0"/>
               </a:rPr>
-              <a:t>Function</a:t>
-            </a:r>
-            <a:endParaRPr lang="pt-BR" sz="1400" dirty="0">
-              <a:latin typeface="Tahoma" panose="020B0604030504040204" pitchFamily="34" charset="0"/>
-              <a:ea typeface="Tahoma" panose="020B0604030504040204" pitchFamily="34" charset="0"/>
-              <a:cs typeface="Tahoma" panose="020B0604030504040204" pitchFamily="34" charset="0"/>
-            </a:endParaRPr>
-          </a:p>
-        </p:txBody>
-      </p:sp>
-      <p:sp>
-        <p:nvSpPr>
-          <p:cNvPr id="21" name="Retângulo 20">
-            <a:extLst>
-              <a:ext uri="{FF2B5EF4-FFF2-40B4-BE49-F238E27FC236}">
-                <a16:creationId xmlns:a16="http://schemas.microsoft.com/office/drawing/2014/main" id="{3C8FA7D4-EE8E-45FD-81C8-0317BF69C29F}"/>
+              <a:t> f =&lt;0) = 0</a:t>
+            </a:r>
+          </a:p>
+        </p:txBody>
+      </p:sp>
+      <p:sp>
+        <p:nvSpPr>
+          <p:cNvPr id="15" name="Retângulo 14">
+            <a:extLst>
+              <a:ext uri="{FF2B5EF4-FFF2-40B4-BE49-F238E27FC236}">
+                <a16:creationId xmlns:a16="http://schemas.microsoft.com/office/drawing/2014/main" id="{7AE351DA-EC78-4447-BAE1-2CB0975E69B7}"/>
               </a:ext>
             </a:extLst>
           </p:cNvPr>
@@ -4718,8 +4777,8 @@
         </p:nvSpPr>
         <p:spPr>
           <a:xfrm>
-            <a:off x="7788492" y="5175673"/>
-            <a:ext cx="3314937" cy="738664"/>
+            <a:off x="4648200" y="4553526"/>
+            <a:ext cx="7308273" cy="1694874"/>
           </a:xfrm>
           <a:prstGeom prst="rect">
             <a:avLst/>
@@ -4758,6 +4817,896 @@
       </p:sp>
       <p:sp>
         <p:nvSpPr>
+          <p:cNvPr id="22" name="Retângulo 21">
+            <a:extLst>
+              <a:ext uri="{FF2B5EF4-FFF2-40B4-BE49-F238E27FC236}">
+                <a16:creationId xmlns:a16="http://schemas.microsoft.com/office/drawing/2014/main" id="{C756FFEF-38D5-4BE9-B9EB-D7B66FEC774E}"/>
+              </a:ext>
+            </a:extLst>
+          </p:cNvPr>
+          <p:cNvSpPr/>
+          <p:nvPr/>
+        </p:nvSpPr>
+        <p:spPr>
+          <a:xfrm>
+            <a:off x="3668168" y="5175673"/>
+            <a:ext cx="7308273" cy="1694874"/>
+          </a:xfrm>
+          <a:prstGeom prst="rect">
+            <a:avLst/>
+          </a:prstGeom>
+          <a:solidFill>
+            <a:srgbClr val="FFFFFF"/>
+          </a:solidFill>
+          <a:ln>
+            <a:noFill/>
+          </a:ln>
+        </p:spPr>
+        <p:style>
+          <a:lnRef idx="2">
+            <a:schemeClr val="accent1">
+              <a:shade val="50000"/>
+            </a:schemeClr>
+          </a:lnRef>
+          <a:fillRef idx="1">
+            <a:schemeClr val="accent1"/>
+          </a:fillRef>
+          <a:effectRef idx="0">
+            <a:schemeClr val="accent1"/>
+          </a:effectRef>
+          <a:fontRef idx="minor">
+            <a:schemeClr val="lt1"/>
+          </a:fontRef>
+        </p:style>
+        <p:txBody>
+          <a:bodyPr rtlCol="0" anchor="ctr"/>
+          <a:lstStyle/>
+          <a:p>
+            <a:pPr algn="ctr"/>
+            <a:endParaRPr lang="pt-BR"/>
+          </a:p>
+        </p:txBody>
+      </p:sp>
+      <p:sp>
+        <p:nvSpPr>
+          <p:cNvPr id="23" name="Retângulo 22">
+            <a:extLst>
+              <a:ext uri="{FF2B5EF4-FFF2-40B4-BE49-F238E27FC236}">
+                <a16:creationId xmlns:a16="http://schemas.microsoft.com/office/drawing/2014/main" id="{D651D65C-9C45-48AD-BC10-016C8741BE2D}"/>
+              </a:ext>
+            </a:extLst>
+          </p:cNvPr>
+          <p:cNvSpPr/>
+          <p:nvPr/>
+        </p:nvSpPr>
+        <p:spPr>
+          <a:xfrm>
+            <a:off x="3668168" y="4547015"/>
+            <a:ext cx="744505" cy="489638"/>
+          </a:xfrm>
+          <a:prstGeom prst="rect">
+            <a:avLst/>
+          </a:prstGeom>
+          <a:solidFill>
+            <a:srgbClr val="FFFFFF"/>
+          </a:solidFill>
+          <a:ln>
+            <a:noFill/>
+          </a:ln>
+        </p:spPr>
+        <p:style>
+          <a:lnRef idx="2">
+            <a:schemeClr val="accent1">
+              <a:shade val="50000"/>
+            </a:schemeClr>
+          </a:lnRef>
+          <a:fillRef idx="1">
+            <a:schemeClr val="accent1"/>
+          </a:fillRef>
+          <a:effectRef idx="0">
+            <a:schemeClr val="accent1"/>
+          </a:effectRef>
+          <a:fontRef idx="minor">
+            <a:schemeClr val="lt1"/>
+          </a:fontRef>
+        </p:style>
+        <p:txBody>
+          <a:bodyPr rtlCol="0" anchor="ctr"/>
+          <a:lstStyle/>
+          <a:p>
+            <a:pPr algn="ctr"/>
+            <a:endParaRPr lang="pt-BR"/>
+          </a:p>
+        </p:txBody>
+      </p:sp>
+    </p:spTree>
+    <p:extLst>
+      <p:ext uri="{BB962C8B-B14F-4D97-AF65-F5344CB8AC3E}">
+        <p14:creationId xmlns:p14="http://schemas.microsoft.com/office/powerpoint/2010/main" val="3573356120"/>
+      </p:ext>
+    </p:extLst>
+  </p:cSld>
+  <p:clrMapOvr>
+    <a:masterClrMapping/>
+  </p:clrMapOvr>
+</p:sld>
+</file>
+
+<file path=ppt/slides/slide5.xml><?xml version="1.0" encoding="utf-8"?>
+<p:sld xmlns:a="http://schemas.openxmlformats.org/drawingml/2006/main" xmlns:r="http://schemas.openxmlformats.org/officeDocument/2006/relationships" xmlns:p="http://schemas.openxmlformats.org/presentationml/2006/main">
+  <p:cSld>
+    <p:spTree>
+      <p:nvGrpSpPr>
+        <p:cNvPr id="1" name=""/>
+        <p:cNvGrpSpPr/>
+        <p:nvPr/>
+      </p:nvGrpSpPr>
+      <p:grpSpPr>
+        <a:xfrm>
+          <a:off x="0" y="0"/>
+          <a:ext cx="0" cy="0"/>
+          <a:chOff x="0" y="0"/>
+          <a:chExt cx="0" cy="0"/>
+        </a:xfrm>
+      </p:grpSpPr>
+      <p:pic>
+        <p:nvPicPr>
+          <p:cNvPr id="3" name="Imagem 2">
+            <a:extLst>
+              <a:ext uri="{FF2B5EF4-FFF2-40B4-BE49-F238E27FC236}">
+                <a16:creationId xmlns:a16="http://schemas.microsoft.com/office/drawing/2014/main" id="{1F1BF814-9D8C-4096-AE25-FCB6BB9F5849}"/>
+              </a:ext>
+            </a:extLst>
+          </p:cNvPr>
+          <p:cNvPicPr>
+            <a:picLocks noChangeAspect="1"/>
+          </p:cNvPicPr>
+          <p:nvPr/>
+        </p:nvPicPr>
+        <p:blipFill>
+          <a:blip r:embed="rId2"/>
+          <a:stretch>
+            <a:fillRect/>
+          </a:stretch>
+        </p:blipFill>
+        <p:spPr>
+          <a:xfrm>
+            <a:off x="0" y="1234835"/>
+            <a:ext cx="12192000" cy="5496692"/>
+          </a:xfrm>
+          <a:prstGeom prst="rect">
+            <a:avLst/>
+          </a:prstGeom>
+        </p:spPr>
+      </p:pic>
+      <p:sp>
+        <p:nvSpPr>
+          <p:cNvPr id="4" name="Retângulo 3">
+            <a:extLst>
+              <a:ext uri="{FF2B5EF4-FFF2-40B4-BE49-F238E27FC236}">
+                <a16:creationId xmlns:a16="http://schemas.microsoft.com/office/drawing/2014/main" id="{8E0D7681-0C96-4FA9-A0CC-2B978A5EB96D}"/>
+              </a:ext>
+            </a:extLst>
+          </p:cNvPr>
+          <p:cNvSpPr/>
+          <p:nvPr/>
+        </p:nvSpPr>
+        <p:spPr>
+          <a:xfrm>
+            <a:off x="0" y="0"/>
+            <a:ext cx="12192000" cy="1371600"/>
+          </a:xfrm>
+          <a:prstGeom prst="rect">
+            <a:avLst/>
+          </a:prstGeom>
+          <a:solidFill>
+            <a:srgbClr val="05CB71"/>
+          </a:solidFill>
+        </p:spPr>
+        <p:style>
+          <a:lnRef idx="2">
+            <a:schemeClr val="accent1">
+              <a:shade val="50000"/>
+            </a:schemeClr>
+          </a:lnRef>
+          <a:fillRef idx="1">
+            <a:schemeClr val="accent1"/>
+          </a:fillRef>
+          <a:effectRef idx="0">
+            <a:schemeClr val="accent1"/>
+          </a:effectRef>
+          <a:fontRef idx="minor">
+            <a:schemeClr val="lt1"/>
+          </a:fontRef>
+        </p:style>
+        <p:txBody>
+          <a:bodyPr rtlCol="0" anchor="ctr"/>
+          <a:lstStyle/>
+          <a:p>
+            <a:pPr algn="ctr"/>
+            <a:r>
+              <a:rPr lang="pt-BR" sz="6600" b="1" dirty="0">
+                <a:effectLst>
+                  <a:outerShdw blurRad="38100" dist="38100" dir="2700000" algn="tl">
+                    <a:srgbClr val="000000">
+                      <a:alpha val="43137"/>
+                    </a:srgbClr>
+                  </a:outerShdw>
+                </a:effectLst>
+                <a:latin typeface="Tahoma" panose="020B0604030504040204" pitchFamily="34" charset="0"/>
+                <a:ea typeface="Tahoma" panose="020B0604030504040204" pitchFamily="34" charset="0"/>
+                <a:cs typeface="Tahoma" panose="020B0604030504040204" pitchFamily="34" charset="0"/>
+              </a:rPr>
+              <a:t>Artificial Neural Networks</a:t>
+            </a:r>
+          </a:p>
+        </p:txBody>
+      </p:sp>
+      <p:sp>
+        <p:nvSpPr>
+          <p:cNvPr id="5" name="CaixaDeTexto 4">
+            <a:extLst>
+              <a:ext uri="{FF2B5EF4-FFF2-40B4-BE49-F238E27FC236}">
+                <a16:creationId xmlns:a16="http://schemas.microsoft.com/office/drawing/2014/main" id="{EBF0E6F4-C1FB-4813-8FC0-943108E5F4AD}"/>
+              </a:ext>
+            </a:extLst>
+          </p:cNvPr>
+          <p:cNvSpPr txBox="1"/>
+          <p:nvPr/>
+        </p:nvSpPr>
+        <p:spPr>
+          <a:xfrm>
+            <a:off x="680852" y="1497611"/>
+            <a:ext cx="2776722" cy="523220"/>
+          </a:xfrm>
+          <a:prstGeom prst="rect">
+            <a:avLst/>
+          </a:prstGeom>
+          <a:noFill/>
+        </p:spPr>
+        <p:txBody>
+          <a:bodyPr wrap="none" rtlCol="0">
+            <a:spAutoFit/>
+          </a:bodyPr>
+          <a:lstStyle/>
+          <a:p>
+            <a:r>
+              <a:rPr lang="pt-BR" sz="2800" b="1" dirty="0" err="1">
+                <a:latin typeface="Tahoma" panose="020B0604030504040204" pitchFamily="34" charset="0"/>
+                <a:ea typeface="Tahoma" panose="020B0604030504040204" pitchFamily="34" charset="0"/>
+                <a:cs typeface="Tahoma" panose="020B0604030504040204" pitchFamily="34" charset="0"/>
+              </a:rPr>
+              <a:t>Step</a:t>
+            </a:r>
+            <a:r>
+              <a:rPr lang="pt-BR" sz="2800" b="1" dirty="0">
+                <a:latin typeface="Tahoma" panose="020B0604030504040204" pitchFamily="34" charset="0"/>
+                <a:ea typeface="Tahoma" panose="020B0604030504040204" pitchFamily="34" charset="0"/>
+                <a:cs typeface="Tahoma" panose="020B0604030504040204" pitchFamily="34" charset="0"/>
+              </a:rPr>
+              <a:t> </a:t>
+            </a:r>
+            <a:r>
+              <a:rPr lang="pt-BR" sz="2800" b="1" dirty="0" err="1">
+                <a:latin typeface="Tahoma" panose="020B0604030504040204" pitchFamily="34" charset="0"/>
+                <a:ea typeface="Tahoma" panose="020B0604030504040204" pitchFamily="34" charset="0"/>
+                <a:cs typeface="Tahoma" panose="020B0604030504040204" pitchFamily="34" charset="0"/>
+              </a:rPr>
+              <a:t>Function</a:t>
+            </a:r>
+            <a:endParaRPr lang="pt-BR" sz="2800" b="1" dirty="0">
+              <a:latin typeface="Tahoma" panose="020B0604030504040204" pitchFamily="34" charset="0"/>
+              <a:ea typeface="Tahoma" panose="020B0604030504040204" pitchFamily="34" charset="0"/>
+              <a:cs typeface="Tahoma" panose="020B0604030504040204" pitchFamily="34" charset="0"/>
+            </a:endParaRPr>
+          </a:p>
+        </p:txBody>
+      </p:sp>
+      <p:sp>
+        <p:nvSpPr>
+          <p:cNvPr id="6" name="Retângulo 5">
+            <a:extLst>
+              <a:ext uri="{FF2B5EF4-FFF2-40B4-BE49-F238E27FC236}">
+                <a16:creationId xmlns:a16="http://schemas.microsoft.com/office/drawing/2014/main" id="{A527B96A-284F-4F40-B01E-F6A7CCF2D7F0}"/>
+              </a:ext>
+            </a:extLst>
+          </p:cNvPr>
+          <p:cNvSpPr/>
+          <p:nvPr/>
+        </p:nvSpPr>
+        <p:spPr>
+          <a:xfrm>
+            <a:off x="193964" y="2701636"/>
+            <a:ext cx="983672" cy="374073"/>
+          </a:xfrm>
+          <a:prstGeom prst="rect">
+            <a:avLst/>
+          </a:prstGeom>
+          <a:solidFill>
+            <a:srgbClr val="FFFFFF"/>
+          </a:solidFill>
+          <a:ln>
+            <a:noFill/>
+          </a:ln>
+        </p:spPr>
+        <p:style>
+          <a:lnRef idx="2">
+            <a:schemeClr val="accent1">
+              <a:shade val="50000"/>
+            </a:schemeClr>
+          </a:lnRef>
+          <a:fillRef idx="1">
+            <a:schemeClr val="accent1"/>
+          </a:fillRef>
+          <a:effectRef idx="0">
+            <a:schemeClr val="accent1"/>
+          </a:effectRef>
+          <a:fontRef idx="minor">
+            <a:schemeClr val="lt1"/>
+          </a:fontRef>
+        </p:style>
+        <p:txBody>
+          <a:bodyPr rtlCol="0" anchor="ctr"/>
+          <a:lstStyle/>
+          <a:p>
+            <a:pPr algn="ctr"/>
+            <a:endParaRPr lang="pt-BR"/>
+          </a:p>
+        </p:txBody>
+      </p:sp>
+      <p:sp>
+        <p:nvSpPr>
+          <p:cNvPr id="10" name="Retângulo 9">
+            <a:extLst>
+              <a:ext uri="{FF2B5EF4-FFF2-40B4-BE49-F238E27FC236}">
+                <a16:creationId xmlns:a16="http://schemas.microsoft.com/office/drawing/2014/main" id="{F9094FD0-18F3-4E25-9C30-548510639E00}"/>
+              </a:ext>
+            </a:extLst>
+          </p:cNvPr>
+          <p:cNvSpPr/>
+          <p:nvPr/>
+        </p:nvSpPr>
+        <p:spPr>
+          <a:xfrm>
+            <a:off x="1545772" y="3189370"/>
+            <a:ext cx="983672" cy="374073"/>
+          </a:xfrm>
+          <a:prstGeom prst="rect">
+            <a:avLst/>
+          </a:prstGeom>
+          <a:solidFill>
+            <a:srgbClr val="FFFFFF"/>
+          </a:solidFill>
+          <a:ln>
+            <a:noFill/>
+          </a:ln>
+        </p:spPr>
+        <p:style>
+          <a:lnRef idx="2">
+            <a:schemeClr val="accent1">
+              <a:shade val="50000"/>
+            </a:schemeClr>
+          </a:lnRef>
+          <a:fillRef idx="1">
+            <a:schemeClr val="accent1"/>
+          </a:fillRef>
+          <a:effectRef idx="0">
+            <a:schemeClr val="accent1"/>
+          </a:effectRef>
+          <a:fontRef idx="minor">
+            <a:schemeClr val="lt1"/>
+          </a:fontRef>
+        </p:style>
+        <p:txBody>
+          <a:bodyPr rtlCol="0" anchor="ctr"/>
+          <a:lstStyle/>
+          <a:p>
+            <a:pPr algn="ctr"/>
+            <a:endParaRPr lang="pt-BR"/>
+          </a:p>
+        </p:txBody>
+      </p:sp>
+      <p:sp>
+        <p:nvSpPr>
+          <p:cNvPr id="11" name="Retângulo 10">
+            <a:extLst>
+              <a:ext uri="{FF2B5EF4-FFF2-40B4-BE49-F238E27FC236}">
+                <a16:creationId xmlns:a16="http://schemas.microsoft.com/office/drawing/2014/main" id="{07E29EBF-7866-4B78-8586-7C05579F3265}"/>
+              </a:ext>
+            </a:extLst>
+          </p:cNvPr>
+          <p:cNvSpPr/>
+          <p:nvPr/>
+        </p:nvSpPr>
+        <p:spPr>
+          <a:xfrm>
+            <a:off x="4818743" y="5020379"/>
+            <a:ext cx="1277257" cy="374073"/>
+          </a:xfrm>
+          <a:prstGeom prst="rect">
+            <a:avLst/>
+          </a:prstGeom>
+          <a:solidFill>
+            <a:srgbClr val="FFFFFF"/>
+          </a:solidFill>
+          <a:ln>
+            <a:noFill/>
+          </a:ln>
+        </p:spPr>
+        <p:style>
+          <a:lnRef idx="2">
+            <a:schemeClr val="accent1">
+              <a:shade val="50000"/>
+            </a:schemeClr>
+          </a:lnRef>
+          <a:fillRef idx="1">
+            <a:schemeClr val="accent1"/>
+          </a:fillRef>
+          <a:effectRef idx="0">
+            <a:schemeClr val="accent1"/>
+          </a:effectRef>
+          <a:fontRef idx="minor">
+            <a:schemeClr val="lt1"/>
+          </a:fontRef>
+        </p:style>
+        <p:txBody>
+          <a:bodyPr rtlCol="0" anchor="ctr"/>
+          <a:lstStyle/>
+          <a:p>
+            <a:pPr algn="ctr"/>
+            <a:endParaRPr lang="pt-BR"/>
+          </a:p>
+        </p:txBody>
+      </p:sp>
+      <p:sp>
+        <p:nvSpPr>
+          <p:cNvPr id="12" name="CaixaDeTexto 11">
+            <a:extLst>
+              <a:ext uri="{FF2B5EF4-FFF2-40B4-BE49-F238E27FC236}">
+                <a16:creationId xmlns:a16="http://schemas.microsoft.com/office/drawing/2014/main" id="{B5671145-4667-4554-9FCA-2D638BFDA4EC}"/>
+              </a:ext>
+            </a:extLst>
+          </p:cNvPr>
+          <p:cNvSpPr txBox="1"/>
+          <p:nvPr/>
+        </p:nvSpPr>
+        <p:spPr>
+          <a:xfrm>
+            <a:off x="314982" y="2809395"/>
+            <a:ext cx="731739" cy="369332"/>
+          </a:xfrm>
+          <a:prstGeom prst="rect">
+            <a:avLst/>
+          </a:prstGeom>
+          <a:noFill/>
+        </p:spPr>
+        <p:txBody>
+          <a:bodyPr wrap="none" rtlCol="0">
+            <a:spAutoFit/>
+          </a:bodyPr>
+          <a:lstStyle/>
+          <a:p>
+            <a:r>
+              <a:rPr lang="pt-BR" dirty="0">
+                <a:latin typeface="Tahoma" panose="020B0604030504040204" pitchFamily="34" charset="0"/>
+                <a:ea typeface="Tahoma" panose="020B0604030504040204" pitchFamily="34" charset="0"/>
+                <a:cs typeface="Tahoma" panose="020B0604030504040204" pitchFamily="34" charset="0"/>
+              </a:rPr>
+              <a:t>Input</a:t>
+            </a:r>
+          </a:p>
+        </p:txBody>
+      </p:sp>
+      <p:sp>
+        <p:nvSpPr>
+          <p:cNvPr id="13" name="CaixaDeTexto 12">
+            <a:extLst>
+              <a:ext uri="{FF2B5EF4-FFF2-40B4-BE49-F238E27FC236}">
+                <a16:creationId xmlns:a16="http://schemas.microsoft.com/office/drawing/2014/main" id="{004BACBB-636E-47CB-AF45-2C43A3FF1366}"/>
+              </a:ext>
+            </a:extLst>
+          </p:cNvPr>
+          <p:cNvSpPr txBox="1"/>
+          <p:nvPr/>
+        </p:nvSpPr>
+        <p:spPr>
+          <a:xfrm>
+            <a:off x="1797705" y="3354804"/>
+            <a:ext cx="892617" cy="369332"/>
+          </a:xfrm>
+          <a:prstGeom prst="rect">
+            <a:avLst/>
+          </a:prstGeom>
+          <a:noFill/>
+        </p:spPr>
+        <p:txBody>
+          <a:bodyPr wrap="none" rtlCol="0">
+            <a:spAutoFit/>
+          </a:bodyPr>
+          <a:lstStyle/>
+          <a:p>
+            <a:r>
+              <a:rPr lang="pt-BR" dirty="0" err="1">
+                <a:latin typeface="Tahoma" panose="020B0604030504040204" pitchFamily="34" charset="0"/>
+                <a:ea typeface="Tahoma" panose="020B0604030504040204" pitchFamily="34" charset="0"/>
+                <a:cs typeface="Tahoma" panose="020B0604030504040204" pitchFamily="34" charset="0"/>
+              </a:rPr>
+              <a:t>Weight</a:t>
+            </a:r>
+            <a:endParaRPr lang="pt-BR" dirty="0">
+              <a:latin typeface="Tahoma" panose="020B0604030504040204" pitchFamily="34" charset="0"/>
+              <a:ea typeface="Tahoma" panose="020B0604030504040204" pitchFamily="34" charset="0"/>
+              <a:cs typeface="Tahoma" panose="020B0604030504040204" pitchFamily="34" charset="0"/>
+            </a:endParaRPr>
+          </a:p>
+        </p:txBody>
+      </p:sp>
+      <p:sp>
+        <p:nvSpPr>
+          <p:cNvPr id="15" name="Retângulo 14">
+            <a:extLst>
+              <a:ext uri="{FF2B5EF4-FFF2-40B4-BE49-F238E27FC236}">
+                <a16:creationId xmlns:a16="http://schemas.microsoft.com/office/drawing/2014/main" id="{7AE351DA-EC78-4447-BAE1-2CB0975E69B7}"/>
+              </a:ext>
+            </a:extLst>
+          </p:cNvPr>
+          <p:cNvSpPr/>
+          <p:nvPr/>
+        </p:nvSpPr>
+        <p:spPr>
+          <a:xfrm>
+            <a:off x="9749971" y="4553526"/>
+            <a:ext cx="2329543" cy="466853"/>
+          </a:xfrm>
+          <a:prstGeom prst="rect">
+            <a:avLst/>
+          </a:prstGeom>
+          <a:solidFill>
+            <a:srgbClr val="FFFFFF"/>
+          </a:solidFill>
+          <a:ln>
+            <a:noFill/>
+          </a:ln>
+        </p:spPr>
+        <p:style>
+          <a:lnRef idx="2">
+            <a:schemeClr val="accent1">
+              <a:shade val="50000"/>
+            </a:schemeClr>
+          </a:lnRef>
+          <a:fillRef idx="1">
+            <a:schemeClr val="accent1"/>
+          </a:fillRef>
+          <a:effectRef idx="0">
+            <a:schemeClr val="accent1"/>
+          </a:effectRef>
+          <a:fontRef idx="minor">
+            <a:schemeClr val="lt1"/>
+          </a:fontRef>
+        </p:style>
+        <p:txBody>
+          <a:bodyPr rtlCol="0" anchor="ctr"/>
+          <a:lstStyle/>
+          <a:p>
+            <a:pPr algn="ctr"/>
+            <a:endParaRPr lang="pt-BR"/>
+          </a:p>
+        </p:txBody>
+      </p:sp>
+      <p:sp>
+        <p:nvSpPr>
+          <p:cNvPr id="16" name="Retângulo 15">
+            <a:extLst>
+              <a:ext uri="{FF2B5EF4-FFF2-40B4-BE49-F238E27FC236}">
+                <a16:creationId xmlns:a16="http://schemas.microsoft.com/office/drawing/2014/main" id="{9C48825D-4F6D-4716-AC72-A2881DA98D8B}"/>
+              </a:ext>
+            </a:extLst>
+          </p:cNvPr>
+          <p:cNvSpPr/>
+          <p:nvPr/>
+        </p:nvSpPr>
+        <p:spPr>
+          <a:xfrm>
+            <a:off x="4648200" y="4553526"/>
+            <a:ext cx="2329543" cy="466853"/>
+          </a:xfrm>
+          <a:prstGeom prst="rect">
+            <a:avLst/>
+          </a:prstGeom>
+          <a:solidFill>
+            <a:srgbClr val="FFFFFF"/>
+          </a:solidFill>
+          <a:ln>
+            <a:noFill/>
+          </a:ln>
+        </p:spPr>
+        <p:style>
+          <a:lnRef idx="2">
+            <a:schemeClr val="accent1">
+              <a:shade val="50000"/>
+            </a:schemeClr>
+          </a:lnRef>
+          <a:fillRef idx="1">
+            <a:schemeClr val="accent1"/>
+          </a:fillRef>
+          <a:effectRef idx="0">
+            <a:schemeClr val="accent1"/>
+          </a:effectRef>
+          <a:fontRef idx="minor">
+            <a:schemeClr val="lt1"/>
+          </a:fontRef>
+        </p:style>
+        <p:txBody>
+          <a:bodyPr rtlCol="0" anchor="ctr"/>
+          <a:lstStyle/>
+          <a:p>
+            <a:pPr algn="ctr"/>
+            <a:endParaRPr lang="pt-BR"/>
+          </a:p>
+        </p:txBody>
+      </p:sp>
+      <p:sp>
+        <p:nvSpPr>
+          <p:cNvPr id="14" name="CaixaDeTexto 13">
+            <a:extLst>
+              <a:ext uri="{FF2B5EF4-FFF2-40B4-BE49-F238E27FC236}">
+                <a16:creationId xmlns:a16="http://schemas.microsoft.com/office/drawing/2014/main" id="{79AB0F90-7EAF-448D-AD2E-AE0CAC73504B}"/>
+              </a:ext>
+            </a:extLst>
+          </p:cNvPr>
+          <p:cNvSpPr txBox="1"/>
+          <p:nvPr/>
+        </p:nvSpPr>
+        <p:spPr>
+          <a:xfrm>
+            <a:off x="4648200" y="4553526"/>
+            <a:ext cx="1326004" cy="369332"/>
+          </a:xfrm>
+          <a:prstGeom prst="rect">
+            <a:avLst/>
+          </a:prstGeom>
+          <a:noFill/>
+        </p:spPr>
+        <p:txBody>
+          <a:bodyPr wrap="none" rtlCol="0">
+            <a:spAutoFit/>
+          </a:bodyPr>
+          <a:lstStyle/>
+          <a:p>
+            <a:r>
+              <a:rPr lang="pt-BR" dirty="0">
+                <a:latin typeface="Tahoma" panose="020B0604030504040204" pitchFamily="34" charset="0"/>
+                <a:ea typeface="Tahoma" panose="020B0604030504040204" pitchFamily="34" charset="0"/>
+                <a:cs typeface="Tahoma" panose="020B0604030504040204" pitchFamily="34" charset="0"/>
+              </a:rPr>
+              <a:t>Output = 1</a:t>
+            </a:r>
+          </a:p>
+        </p:txBody>
+      </p:sp>
+      <p:sp>
+        <p:nvSpPr>
+          <p:cNvPr id="17" name="Retângulo 16">
+            <a:extLst>
+              <a:ext uri="{FF2B5EF4-FFF2-40B4-BE49-F238E27FC236}">
+                <a16:creationId xmlns:a16="http://schemas.microsoft.com/office/drawing/2014/main" id="{4AA26FFD-C9E7-4CB4-9E7F-F34D0691E611}"/>
+              </a:ext>
+            </a:extLst>
+          </p:cNvPr>
+          <p:cNvSpPr/>
+          <p:nvPr/>
+        </p:nvSpPr>
+        <p:spPr>
+          <a:xfrm>
+            <a:off x="2607824" y="5124542"/>
+            <a:ext cx="1833547" cy="830997"/>
+          </a:xfrm>
+          <a:prstGeom prst="rect">
+            <a:avLst/>
+          </a:prstGeom>
+          <a:solidFill>
+            <a:srgbClr val="FFFFFF"/>
+          </a:solidFill>
+          <a:ln>
+            <a:noFill/>
+          </a:ln>
+        </p:spPr>
+        <p:style>
+          <a:lnRef idx="2">
+            <a:schemeClr val="accent1">
+              <a:shade val="50000"/>
+            </a:schemeClr>
+          </a:lnRef>
+          <a:fillRef idx="1">
+            <a:schemeClr val="accent1"/>
+          </a:fillRef>
+          <a:effectRef idx="0">
+            <a:schemeClr val="accent1"/>
+          </a:effectRef>
+          <a:fontRef idx="minor">
+            <a:schemeClr val="lt1"/>
+          </a:fontRef>
+        </p:style>
+        <p:txBody>
+          <a:bodyPr rtlCol="0" anchor="ctr"/>
+          <a:lstStyle/>
+          <a:p>
+            <a:pPr algn="ctr"/>
+            <a:endParaRPr lang="pt-BR"/>
+          </a:p>
+        </p:txBody>
+      </p:sp>
+      <p:sp>
+        <p:nvSpPr>
+          <p:cNvPr id="18" name="CaixaDeTexto 17">
+            <a:extLst>
+              <a:ext uri="{FF2B5EF4-FFF2-40B4-BE49-F238E27FC236}">
+                <a16:creationId xmlns:a16="http://schemas.microsoft.com/office/drawing/2014/main" id="{E7400555-1128-45EF-8F51-4D18A8360CBA}"/>
+              </a:ext>
+            </a:extLst>
+          </p:cNvPr>
+          <p:cNvSpPr txBox="1"/>
+          <p:nvPr/>
+        </p:nvSpPr>
+        <p:spPr>
+          <a:xfrm>
+            <a:off x="2607824" y="5207415"/>
+            <a:ext cx="857927" cy="523220"/>
+          </a:xfrm>
+          <a:prstGeom prst="rect">
+            <a:avLst/>
+          </a:prstGeom>
+          <a:noFill/>
+        </p:spPr>
+        <p:txBody>
+          <a:bodyPr wrap="none" rtlCol="0">
+            <a:spAutoFit/>
+          </a:bodyPr>
+          <a:lstStyle/>
+          <a:p>
+            <a:pPr algn="ctr"/>
+            <a:r>
+              <a:rPr lang="pt-BR" sz="1400" dirty="0">
+                <a:latin typeface="Tahoma" panose="020B0604030504040204" pitchFamily="34" charset="0"/>
+                <a:ea typeface="Tahoma" panose="020B0604030504040204" pitchFamily="34" charset="0"/>
+                <a:cs typeface="Tahoma" panose="020B0604030504040204" pitchFamily="34" charset="0"/>
+              </a:rPr>
+              <a:t>Sum </a:t>
+            </a:r>
+          </a:p>
+          <a:p>
+            <a:pPr algn="ctr"/>
+            <a:r>
+              <a:rPr lang="pt-BR" sz="1400" dirty="0" err="1">
+                <a:latin typeface="Tahoma" panose="020B0604030504040204" pitchFamily="34" charset="0"/>
+                <a:ea typeface="Tahoma" panose="020B0604030504040204" pitchFamily="34" charset="0"/>
+                <a:cs typeface="Tahoma" panose="020B0604030504040204" pitchFamily="34" charset="0"/>
+              </a:rPr>
+              <a:t>Function</a:t>
+            </a:r>
+            <a:endParaRPr lang="pt-BR" sz="1400" dirty="0">
+              <a:latin typeface="Tahoma" panose="020B0604030504040204" pitchFamily="34" charset="0"/>
+              <a:ea typeface="Tahoma" panose="020B0604030504040204" pitchFamily="34" charset="0"/>
+              <a:cs typeface="Tahoma" panose="020B0604030504040204" pitchFamily="34" charset="0"/>
+            </a:endParaRPr>
+          </a:p>
+        </p:txBody>
+      </p:sp>
+      <p:sp>
+        <p:nvSpPr>
+          <p:cNvPr id="19" name="CaixaDeTexto 18">
+            <a:extLst>
+              <a:ext uri="{FF2B5EF4-FFF2-40B4-BE49-F238E27FC236}">
+                <a16:creationId xmlns:a16="http://schemas.microsoft.com/office/drawing/2014/main" id="{06E4902B-35A8-4ADA-BE93-F8A791DA8BDC}"/>
+              </a:ext>
+            </a:extLst>
+          </p:cNvPr>
+          <p:cNvSpPr txBox="1"/>
+          <p:nvPr/>
+        </p:nvSpPr>
+        <p:spPr>
+          <a:xfrm>
+            <a:off x="3576096" y="5207415"/>
+            <a:ext cx="857927" cy="523220"/>
+          </a:xfrm>
+          <a:prstGeom prst="rect">
+            <a:avLst/>
+          </a:prstGeom>
+          <a:noFill/>
+        </p:spPr>
+        <p:txBody>
+          <a:bodyPr wrap="none" rtlCol="0">
+            <a:spAutoFit/>
+          </a:bodyPr>
+          <a:lstStyle/>
+          <a:p>
+            <a:pPr algn="ctr"/>
+            <a:r>
+              <a:rPr lang="pt-BR" sz="1400" dirty="0" err="1">
+                <a:latin typeface="Tahoma" panose="020B0604030504040204" pitchFamily="34" charset="0"/>
+                <a:ea typeface="Tahoma" panose="020B0604030504040204" pitchFamily="34" charset="0"/>
+                <a:cs typeface="Tahoma" panose="020B0604030504040204" pitchFamily="34" charset="0"/>
+              </a:rPr>
+              <a:t>Step</a:t>
+            </a:r>
+            <a:endParaRPr lang="pt-BR" sz="1400" dirty="0">
+              <a:latin typeface="Tahoma" panose="020B0604030504040204" pitchFamily="34" charset="0"/>
+              <a:ea typeface="Tahoma" panose="020B0604030504040204" pitchFamily="34" charset="0"/>
+              <a:cs typeface="Tahoma" panose="020B0604030504040204" pitchFamily="34" charset="0"/>
+            </a:endParaRPr>
+          </a:p>
+          <a:p>
+            <a:pPr algn="ctr"/>
+            <a:r>
+              <a:rPr lang="pt-BR" sz="1400" dirty="0" err="1">
+                <a:latin typeface="Tahoma" panose="020B0604030504040204" pitchFamily="34" charset="0"/>
+                <a:ea typeface="Tahoma" panose="020B0604030504040204" pitchFamily="34" charset="0"/>
+                <a:cs typeface="Tahoma" panose="020B0604030504040204" pitchFamily="34" charset="0"/>
+              </a:rPr>
+              <a:t>Function</a:t>
+            </a:r>
+            <a:endParaRPr lang="pt-BR" sz="1400" dirty="0">
+              <a:latin typeface="Tahoma" panose="020B0604030504040204" pitchFamily="34" charset="0"/>
+              <a:ea typeface="Tahoma" panose="020B0604030504040204" pitchFamily="34" charset="0"/>
+              <a:cs typeface="Tahoma" panose="020B0604030504040204" pitchFamily="34" charset="0"/>
+            </a:endParaRPr>
+          </a:p>
+        </p:txBody>
+      </p:sp>
+      <p:sp>
+        <p:nvSpPr>
+          <p:cNvPr id="21" name="Retângulo 20">
+            <a:extLst>
+              <a:ext uri="{FF2B5EF4-FFF2-40B4-BE49-F238E27FC236}">
+                <a16:creationId xmlns:a16="http://schemas.microsoft.com/office/drawing/2014/main" id="{3C8FA7D4-EE8E-45FD-81C8-0317BF69C29F}"/>
+              </a:ext>
+            </a:extLst>
+          </p:cNvPr>
+          <p:cNvSpPr/>
+          <p:nvPr/>
+        </p:nvSpPr>
+        <p:spPr>
+          <a:xfrm>
+            <a:off x="7788492" y="5175673"/>
+            <a:ext cx="3314937" cy="738664"/>
+          </a:xfrm>
+          <a:prstGeom prst="rect">
+            <a:avLst/>
+          </a:prstGeom>
+          <a:solidFill>
+            <a:srgbClr val="FFFFFF"/>
+          </a:solidFill>
+          <a:ln>
+            <a:noFill/>
+          </a:ln>
+        </p:spPr>
+        <p:style>
+          <a:lnRef idx="2">
+            <a:schemeClr val="accent1">
+              <a:shade val="50000"/>
+            </a:schemeClr>
+          </a:lnRef>
+          <a:fillRef idx="1">
+            <a:schemeClr val="accent1"/>
+          </a:fillRef>
+          <a:effectRef idx="0">
+            <a:schemeClr val="accent1"/>
+          </a:effectRef>
+          <a:fontRef idx="minor">
+            <a:schemeClr val="lt1"/>
+          </a:fontRef>
+        </p:style>
+        <p:txBody>
+          <a:bodyPr rtlCol="0" anchor="ctr"/>
+          <a:lstStyle/>
+          <a:p>
+            <a:pPr algn="ctr"/>
+            <a:endParaRPr lang="pt-BR"/>
+          </a:p>
+        </p:txBody>
+      </p:sp>
+      <p:sp>
+        <p:nvSpPr>
           <p:cNvPr id="20" name="CaixaDeTexto 19">
             <a:extLst>
               <a:ext uri="{FF2B5EF4-FFF2-40B4-BE49-F238E27FC236}">
@@ -4847,7 +5796,7 @@
     </p:spTree>
     <p:extLst>
       <p:ext uri="{BB962C8B-B14F-4D97-AF65-F5344CB8AC3E}">
-        <p14:creationId xmlns:p14="http://schemas.microsoft.com/office/powerpoint/2010/main" val="3573356120"/>
+        <p14:creationId xmlns:p14="http://schemas.microsoft.com/office/powerpoint/2010/main" val="3050884176"/>
       </p:ext>
     </p:extLst>
   </p:cSld>

</xml_diff>

<commit_message>
update neural networks - 6
</commit_message>
<xml_diff>
--- a/_Neural_Networks/Neural_Networks - Projeto.pptx
+++ b/_Neural_Networks/Neural_Networks - Projeto.pptx
@@ -10,6 +10,7 @@
     <p:sldId id="260" r:id="rId4"/>
     <p:sldId id="261" r:id="rId5"/>
     <p:sldId id="262" r:id="rId6"/>
+    <p:sldId id="263" r:id="rId7"/>
   </p:sldIdLst>
   <p:sldSz cx="12192000" cy="6858000"/>
   <p:notesSz cx="6858000" cy="9144000"/>
@@ -5806,6 +5807,1000 @@
 </p:sld>
 </file>
 
+<file path=ppt/slides/slide6.xml><?xml version="1.0" encoding="utf-8"?>
+<p:sld xmlns:a="http://schemas.openxmlformats.org/drawingml/2006/main" xmlns:r="http://schemas.openxmlformats.org/officeDocument/2006/relationships" xmlns:p="http://schemas.openxmlformats.org/presentationml/2006/main">
+  <p:cSld>
+    <p:spTree>
+      <p:nvGrpSpPr>
+        <p:cNvPr id="1" name=""/>
+        <p:cNvGrpSpPr/>
+        <p:nvPr/>
+      </p:nvGrpSpPr>
+      <p:grpSpPr>
+        <a:xfrm>
+          <a:off x="0" y="0"/>
+          <a:ext cx="0" cy="0"/>
+          <a:chOff x="0" y="0"/>
+          <a:chExt cx="0" cy="0"/>
+        </a:xfrm>
+      </p:grpSpPr>
+      <p:pic>
+        <p:nvPicPr>
+          <p:cNvPr id="7" name="Imagem 6">
+            <a:extLst>
+              <a:ext uri="{FF2B5EF4-FFF2-40B4-BE49-F238E27FC236}">
+                <a16:creationId xmlns:a16="http://schemas.microsoft.com/office/drawing/2014/main" id="{0D2D1637-624F-4DC9-9834-93DBC834E09C}"/>
+              </a:ext>
+            </a:extLst>
+          </p:cNvPr>
+          <p:cNvPicPr>
+            <a:picLocks noChangeAspect="1"/>
+          </p:cNvPicPr>
+          <p:nvPr/>
+        </p:nvPicPr>
+        <p:blipFill>
+          <a:blip r:embed="rId2"/>
+          <a:stretch>
+            <a:fillRect/>
+          </a:stretch>
+        </p:blipFill>
+        <p:spPr>
+          <a:xfrm>
+            <a:off x="2341215" y="1391539"/>
+            <a:ext cx="8926171" cy="5534797"/>
+          </a:xfrm>
+          <a:prstGeom prst="rect">
+            <a:avLst/>
+          </a:prstGeom>
+        </p:spPr>
+      </p:pic>
+      <p:sp>
+        <p:nvSpPr>
+          <p:cNvPr id="5" name="CaixaDeTexto 4">
+            <a:extLst>
+              <a:ext uri="{FF2B5EF4-FFF2-40B4-BE49-F238E27FC236}">
+                <a16:creationId xmlns:a16="http://schemas.microsoft.com/office/drawing/2014/main" id="{EBF0E6F4-C1FB-4813-8FC0-943108E5F4AD}"/>
+              </a:ext>
+            </a:extLst>
+          </p:cNvPr>
+          <p:cNvSpPr txBox="1"/>
+          <p:nvPr/>
+        </p:nvSpPr>
+        <p:spPr>
+          <a:xfrm>
+            <a:off x="680852" y="1497611"/>
+            <a:ext cx="4094391" cy="523220"/>
+          </a:xfrm>
+          <a:prstGeom prst="rect">
+            <a:avLst/>
+          </a:prstGeom>
+          <a:noFill/>
+        </p:spPr>
+        <p:txBody>
+          <a:bodyPr wrap="none" rtlCol="0">
+            <a:spAutoFit/>
+          </a:bodyPr>
+          <a:lstStyle/>
+          <a:p>
+            <a:r>
+              <a:rPr lang="pt-BR" sz="2800" b="1" dirty="0" err="1">
+                <a:latin typeface="Tahoma" panose="020B0604030504040204" pitchFamily="34" charset="0"/>
+                <a:ea typeface="Tahoma" panose="020B0604030504040204" pitchFamily="34" charset="0"/>
+                <a:cs typeface="Tahoma" panose="020B0604030504040204" pitchFamily="34" charset="0"/>
+              </a:rPr>
+              <a:t>Multilayer</a:t>
+            </a:r>
+            <a:r>
+              <a:rPr lang="pt-BR" sz="2800" b="1" dirty="0">
+                <a:latin typeface="Tahoma" panose="020B0604030504040204" pitchFamily="34" charset="0"/>
+                <a:ea typeface="Tahoma" panose="020B0604030504040204" pitchFamily="34" charset="0"/>
+                <a:cs typeface="Tahoma" panose="020B0604030504040204" pitchFamily="34" charset="0"/>
+              </a:rPr>
+              <a:t> </a:t>
+            </a:r>
+            <a:r>
+              <a:rPr lang="pt-BR" sz="2800" b="1" dirty="0" err="1">
+                <a:latin typeface="Tahoma" panose="020B0604030504040204" pitchFamily="34" charset="0"/>
+                <a:ea typeface="Tahoma" panose="020B0604030504040204" pitchFamily="34" charset="0"/>
+                <a:cs typeface="Tahoma" panose="020B0604030504040204" pitchFamily="34" charset="0"/>
+              </a:rPr>
+              <a:t>Perceptron</a:t>
+            </a:r>
+            <a:endParaRPr lang="pt-BR" sz="2800" b="1" dirty="0">
+              <a:latin typeface="Tahoma" panose="020B0604030504040204" pitchFamily="34" charset="0"/>
+              <a:ea typeface="Tahoma" panose="020B0604030504040204" pitchFamily="34" charset="0"/>
+              <a:cs typeface="Tahoma" panose="020B0604030504040204" pitchFamily="34" charset="0"/>
+            </a:endParaRPr>
+          </a:p>
+        </p:txBody>
+      </p:sp>
+      <p:sp>
+        <p:nvSpPr>
+          <p:cNvPr id="6" name="Retângulo 5">
+            <a:extLst>
+              <a:ext uri="{FF2B5EF4-FFF2-40B4-BE49-F238E27FC236}">
+                <a16:creationId xmlns:a16="http://schemas.microsoft.com/office/drawing/2014/main" id="{A527B96A-284F-4F40-B01E-F6A7CCF2D7F0}"/>
+              </a:ext>
+            </a:extLst>
+          </p:cNvPr>
+          <p:cNvSpPr/>
+          <p:nvPr/>
+        </p:nvSpPr>
+        <p:spPr>
+          <a:xfrm>
+            <a:off x="193964" y="2701636"/>
+            <a:ext cx="983672" cy="374073"/>
+          </a:xfrm>
+          <a:prstGeom prst="rect">
+            <a:avLst/>
+          </a:prstGeom>
+          <a:solidFill>
+            <a:srgbClr val="FFFFFF"/>
+          </a:solidFill>
+          <a:ln>
+            <a:noFill/>
+          </a:ln>
+        </p:spPr>
+        <p:style>
+          <a:lnRef idx="2">
+            <a:schemeClr val="accent1">
+              <a:shade val="50000"/>
+            </a:schemeClr>
+          </a:lnRef>
+          <a:fillRef idx="1">
+            <a:schemeClr val="accent1"/>
+          </a:fillRef>
+          <a:effectRef idx="0">
+            <a:schemeClr val="accent1"/>
+          </a:effectRef>
+          <a:fontRef idx="minor">
+            <a:schemeClr val="lt1"/>
+          </a:fontRef>
+        </p:style>
+        <p:txBody>
+          <a:bodyPr rtlCol="0" anchor="ctr"/>
+          <a:lstStyle/>
+          <a:p>
+            <a:pPr algn="ctr"/>
+            <a:endParaRPr lang="pt-BR"/>
+          </a:p>
+        </p:txBody>
+      </p:sp>
+      <p:sp>
+        <p:nvSpPr>
+          <p:cNvPr id="10" name="Retângulo 9">
+            <a:extLst>
+              <a:ext uri="{FF2B5EF4-FFF2-40B4-BE49-F238E27FC236}">
+                <a16:creationId xmlns:a16="http://schemas.microsoft.com/office/drawing/2014/main" id="{F9094FD0-18F3-4E25-9C30-548510639E00}"/>
+              </a:ext>
+            </a:extLst>
+          </p:cNvPr>
+          <p:cNvSpPr/>
+          <p:nvPr/>
+        </p:nvSpPr>
+        <p:spPr>
+          <a:xfrm>
+            <a:off x="1545772" y="3189370"/>
+            <a:ext cx="983672" cy="374073"/>
+          </a:xfrm>
+          <a:prstGeom prst="rect">
+            <a:avLst/>
+          </a:prstGeom>
+          <a:solidFill>
+            <a:srgbClr val="FFFFFF"/>
+          </a:solidFill>
+          <a:ln>
+            <a:noFill/>
+          </a:ln>
+        </p:spPr>
+        <p:style>
+          <a:lnRef idx="2">
+            <a:schemeClr val="accent1">
+              <a:shade val="50000"/>
+            </a:schemeClr>
+          </a:lnRef>
+          <a:fillRef idx="1">
+            <a:schemeClr val="accent1"/>
+          </a:fillRef>
+          <a:effectRef idx="0">
+            <a:schemeClr val="accent1"/>
+          </a:effectRef>
+          <a:fontRef idx="minor">
+            <a:schemeClr val="lt1"/>
+          </a:fontRef>
+        </p:style>
+        <p:txBody>
+          <a:bodyPr rtlCol="0" anchor="ctr"/>
+          <a:lstStyle/>
+          <a:p>
+            <a:pPr algn="ctr"/>
+            <a:endParaRPr lang="pt-BR"/>
+          </a:p>
+        </p:txBody>
+      </p:sp>
+      <p:sp>
+        <p:nvSpPr>
+          <p:cNvPr id="11" name="Retângulo 10">
+            <a:extLst>
+              <a:ext uri="{FF2B5EF4-FFF2-40B4-BE49-F238E27FC236}">
+                <a16:creationId xmlns:a16="http://schemas.microsoft.com/office/drawing/2014/main" id="{07E29EBF-7866-4B78-8586-7C05579F3265}"/>
+              </a:ext>
+            </a:extLst>
+          </p:cNvPr>
+          <p:cNvSpPr/>
+          <p:nvPr/>
+        </p:nvSpPr>
+        <p:spPr>
+          <a:xfrm rot="2596605">
+            <a:off x="7002078" y="2813594"/>
+            <a:ext cx="1277257" cy="374073"/>
+          </a:xfrm>
+          <a:prstGeom prst="rect">
+            <a:avLst/>
+          </a:prstGeom>
+          <a:solidFill>
+            <a:srgbClr val="FFFFFF"/>
+          </a:solidFill>
+          <a:ln>
+            <a:noFill/>
+          </a:ln>
+        </p:spPr>
+        <p:style>
+          <a:lnRef idx="2">
+            <a:schemeClr val="accent1">
+              <a:shade val="50000"/>
+            </a:schemeClr>
+          </a:lnRef>
+          <a:fillRef idx="1">
+            <a:schemeClr val="accent1"/>
+          </a:fillRef>
+          <a:effectRef idx="0">
+            <a:schemeClr val="accent1"/>
+          </a:effectRef>
+          <a:fontRef idx="minor">
+            <a:schemeClr val="lt1"/>
+          </a:fontRef>
+        </p:style>
+        <p:txBody>
+          <a:bodyPr rtlCol="0" anchor="ctr"/>
+          <a:lstStyle/>
+          <a:p>
+            <a:pPr algn="ctr"/>
+            <a:endParaRPr lang="pt-BR" dirty="0"/>
+          </a:p>
+        </p:txBody>
+      </p:sp>
+      <p:sp>
+        <p:nvSpPr>
+          <p:cNvPr id="12" name="CaixaDeTexto 11">
+            <a:extLst>
+              <a:ext uri="{FF2B5EF4-FFF2-40B4-BE49-F238E27FC236}">
+                <a16:creationId xmlns:a16="http://schemas.microsoft.com/office/drawing/2014/main" id="{B5671145-4667-4554-9FCA-2D638BFDA4EC}"/>
+              </a:ext>
+            </a:extLst>
+          </p:cNvPr>
+          <p:cNvSpPr txBox="1"/>
+          <p:nvPr/>
+        </p:nvSpPr>
+        <p:spPr>
+          <a:xfrm>
+            <a:off x="2081355" y="3831408"/>
+            <a:ext cx="731739" cy="369332"/>
+          </a:xfrm>
+          <a:prstGeom prst="rect">
+            <a:avLst/>
+          </a:prstGeom>
+          <a:noFill/>
+        </p:spPr>
+        <p:txBody>
+          <a:bodyPr wrap="none" rtlCol="0">
+            <a:spAutoFit/>
+          </a:bodyPr>
+          <a:lstStyle/>
+          <a:p>
+            <a:r>
+              <a:rPr lang="pt-BR" dirty="0">
+                <a:latin typeface="Tahoma" panose="020B0604030504040204" pitchFamily="34" charset="0"/>
+                <a:ea typeface="Tahoma" panose="020B0604030504040204" pitchFamily="34" charset="0"/>
+                <a:cs typeface="Tahoma" panose="020B0604030504040204" pitchFamily="34" charset="0"/>
+              </a:rPr>
+              <a:t>Input</a:t>
+            </a:r>
+          </a:p>
+        </p:txBody>
+      </p:sp>
+      <p:sp>
+        <p:nvSpPr>
+          <p:cNvPr id="15" name="Retângulo 14">
+            <a:extLst>
+              <a:ext uri="{FF2B5EF4-FFF2-40B4-BE49-F238E27FC236}">
+                <a16:creationId xmlns:a16="http://schemas.microsoft.com/office/drawing/2014/main" id="{7AE351DA-EC78-4447-BAE1-2CB0975E69B7}"/>
+              </a:ext>
+            </a:extLst>
+          </p:cNvPr>
+          <p:cNvSpPr/>
+          <p:nvPr/>
+        </p:nvSpPr>
+        <p:spPr>
+          <a:xfrm>
+            <a:off x="8390707" y="4341272"/>
+            <a:ext cx="2329543" cy="1137161"/>
+          </a:xfrm>
+          <a:prstGeom prst="rect">
+            <a:avLst/>
+          </a:prstGeom>
+          <a:solidFill>
+            <a:srgbClr val="FFFFFF"/>
+          </a:solidFill>
+          <a:ln>
+            <a:noFill/>
+          </a:ln>
+        </p:spPr>
+        <p:style>
+          <a:lnRef idx="2">
+            <a:schemeClr val="accent1">
+              <a:shade val="50000"/>
+            </a:schemeClr>
+          </a:lnRef>
+          <a:fillRef idx="1">
+            <a:schemeClr val="accent1"/>
+          </a:fillRef>
+          <a:effectRef idx="0">
+            <a:schemeClr val="accent1"/>
+          </a:effectRef>
+          <a:fontRef idx="minor">
+            <a:schemeClr val="lt1"/>
+          </a:fontRef>
+        </p:style>
+        <p:txBody>
+          <a:bodyPr rtlCol="0" anchor="ctr"/>
+          <a:lstStyle/>
+          <a:p>
+            <a:pPr algn="ctr"/>
+            <a:endParaRPr lang="pt-BR"/>
+          </a:p>
+        </p:txBody>
+      </p:sp>
+      <p:sp>
+        <p:nvSpPr>
+          <p:cNvPr id="16" name="Retângulo 15">
+            <a:extLst>
+              <a:ext uri="{FF2B5EF4-FFF2-40B4-BE49-F238E27FC236}">
+                <a16:creationId xmlns:a16="http://schemas.microsoft.com/office/drawing/2014/main" id="{9C48825D-4F6D-4716-AC72-A2881DA98D8B}"/>
+              </a:ext>
+            </a:extLst>
+          </p:cNvPr>
+          <p:cNvSpPr/>
+          <p:nvPr/>
+        </p:nvSpPr>
+        <p:spPr>
+          <a:xfrm>
+            <a:off x="2529444" y="5914337"/>
+            <a:ext cx="2329543" cy="466853"/>
+          </a:xfrm>
+          <a:prstGeom prst="rect">
+            <a:avLst/>
+          </a:prstGeom>
+          <a:solidFill>
+            <a:srgbClr val="FFFFFF"/>
+          </a:solidFill>
+          <a:ln>
+            <a:noFill/>
+          </a:ln>
+        </p:spPr>
+        <p:style>
+          <a:lnRef idx="2">
+            <a:schemeClr val="accent1">
+              <a:shade val="50000"/>
+            </a:schemeClr>
+          </a:lnRef>
+          <a:fillRef idx="1">
+            <a:schemeClr val="accent1"/>
+          </a:fillRef>
+          <a:effectRef idx="0">
+            <a:schemeClr val="accent1"/>
+          </a:effectRef>
+          <a:fontRef idx="minor">
+            <a:schemeClr val="lt1"/>
+          </a:fontRef>
+        </p:style>
+        <p:txBody>
+          <a:bodyPr rtlCol="0" anchor="ctr"/>
+          <a:lstStyle/>
+          <a:p>
+            <a:pPr algn="ctr"/>
+            <a:endParaRPr lang="pt-BR"/>
+          </a:p>
+        </p:txBody>
+      </p:sp>
+      <p:sp>
+        <p:nvSpPr>
+          <p:cNvPr id="14" name="CaixaDeTexto 13">
+            <a:extLst>
+              <a:ext uri="{FF2B5EF4-FFF2-40B4-BE49-F238E27FC236}">
+                <a16:creationId xmlns:a16="http://schemas.microsoft.com/office/drawing/2014/main" id="{79AB0F90-7EAF-448D-AD2E-AE0CAC73504B}"/>
+              </a:ext>
+            </a:extLst>
+          </p:cNvPr>
+          <p:cNvSpPr txBox="1"/>
+          <p:nvPr/>
+        </p:nvSpPr>
+        <p:spPr>
+          <a:xfrm>
+            <a:off x="10120745" y="3580448"/>
+            <a:ext cx="886781" cy="369332"/>
+          </a:xfrm>
+          <a:prstGeom prst="rect">
+            <a:avLst/>
+          </a:prstGeom>
+          <a:noFill/>
+        </p:spPr>
+        <p:txBody>
+          <a:bodyPr wrap="none" rtlCol="0">
+            <a:spAutoFit/>
+          </a:bodyPr>
+          <a:lstStyle/>
+          <a:p>
+            <a:r>
+              <a:rPr lang="pt-BR" dirty="0">
+                <a:latin typeface="Tahoma" panose="020B0604030504040204" pitchFamily="34" charset="0"/>
+                <a:ea typeface="Tahoma" panose="020B0604030504040204" pitchFamily="34" charset="0"/>
+                <a:cs typeface="Tahoma" panose="020B0604030504040204" pitchFamily="34" charset="0"/>
+              </a:rPr>
+              <a:t>Output</a:t>
+            </a:r>
+          </a:p>
+        </p:txBody>
+      </p:sp>
+      <p:sp>
+        <p:nvSpPr>
+          <p:cNvPr id="17" name="Retângulo 16">
+            <a:extLst>
+              <a:ext uri="{FF2B5EF4-FFF2-40B4-BE49-F238E27FC236}">
+                <a16:creationId xmlns:a16="http://schemas.microsoft.com/office/drawing/2014/main" id="{4AA26FFD-C9E7-4CB4-9E7F-F34D0691E611}"/>
+              </a:ext>
+            </a:extLst>
+          </p:cNvPr>
+          <p:cNvSpPr/>
+          <p:nvPr/>
+        </p:nvSpPr>
+        <p:spPr>
+          <a:xfrm>
+            <a:off x="2837999" y="2371011"/>
+            <a:ext cx="968627" cy="523220"/>
+          </a:xfrm>
+          <a:prstGeom prst="rect">
+            <a:avLst/>
+          </a:prstGeom>
+          <a:solidFill>
+            <a:srgbClr val="FFFFFF"/>
+          </a:solidFill>
+          <a:ln>
+            <a:noFill/>
+          </a:ln>
+        </p:spPr>
+        <p:style>
+          <a:lnRef idx="2">
+            <a:schemeClr val="accent1">
+              <a:shade val="50000"/>
+            </a:schemeClr>
+          </a:lnRef>
+          <a:fillRef idx="1">
+            <a:schemeClr val="accent1"/>
+          </a:fillRef>
+          <a:effectRef idx="0">
+            <a:schemeClr val="accent1"/>
+          </a:effectRef>
+          <a:fontRef idx="minor">
+            <a:schemeClr val="lt1"/>
+          </a:fontRef>
+        </p:style>
+        <p:txBody>
+          <a:bodyPr rtlCol="0" anchor="ctr"/>
+          <a:lstStyle/>
+          <a:p>
+            <a:pPr algn="ctr"/>
+            <a:endParaRPr lang="pt-BR"/>
+          </a:p>
+        </p:txBody>
+      </p:sp>
+      <p:sp>
+        <p:nvSpPr>
+          <p:cNvPr id="18" name="CaixaDeTexto 17">
+            <a:extLst>
+              <a:ext uri="{FF2B5EF4-FFF2-40B4-BE49-F238E27FC236}">
+                <a16:creationId xmlns:a16="http://schemas.microsoft.com/office/drawing/2014/main" id="{E7400555-1128-45EF-8F51-4D18A8360CBA}"/>
+              </a:ext>
+            </a:extLst>
+          </p:cNvPr>
+          <p:cNvSpPr txBox="1"/>
+          <p:nvPr/>
+        </p:nvSpPr>
+        <p:spPr>
+          <a:xfrm>
+            <a:off x="8209142" y="4496863"/>
+            <a:ext cx="857927" cy="523220"/>
+          </a:xfrm>
+          <a:prstGeom prst="rect">
+            <a:avLst/>
+          </a:prstGeom>
+          <a:noFill/>
+        </p:spPr>
+        <p:txBody>
+          <a:bodyPr wrap="none" rtlCol="0">
+            <a:spAutoFit/>
+          </a:bodyPr>
+          <a:lstStyle/>
+          <a:p>
+            <a:pPr algn="ctr"/>
+            <a:r>
+              <a:rPr lang="pt-BR" sz="1400" dirty="0">
+                <a:latin typeface="Tahoma" panose="020B0604030504040204" pitchFamily="34" charset="0"/>
+                <a:ea typeface="Tahoma" panose="020B0604030504040204" pitchFamily="34" charset="0"/>
+                <a:cs typeface="Tahoma" panose="020B0604030504040204" pitchFamily="34" charset="0"/>
+              </a:rPr>
+              <a:t>Sum </a:t>
+            </a:r>
+          </a:p>
+          <a:p>
+            <a:pPr algn="ctr"/>
+            <a:r>
+              <a:rPr lang="pt-BR" sz="1400" dirty="0" err="1">
+                <a:latin typeface="Tahoma" panose="020B0604030504040204" pitchFamily="34" charset="0"/>
+                <a:ea typeface="Tahoma" panose="020B0604030504040204" pitchFamily="34" charset="0"/>
+                <a:cs typeface="Tahoma" panose="020B0604030504040204" pitchFamily="34" charset="0"/>
+              </a:rPr>
+              <a:t>Function</a:t>
+            </a:r>
+            <a:endParaRPr lang="pt-BR" sz="1400" dirty="0">
+              <a:latin typeface="Tahoma" panose="020B0604030504040204" pitchFamily="34" charset="0"/>
+              <a:ea typeface="Tahoma" panose="020B0604030504040204" pitchFamily="34" charset="0"/>
+              <a:cs typeface="Tahoma" panose="020B0604030504040204" pitchFamily="34" charset="0"/>
+            </a:endParaRPr>
+          </a:p>
+        </p:txBody>
+      </p:sp>
+      <p:sp>
+        <p:nvSpPr>
+          <p:cNvPr id="19" name="CaixaDeTexto 18">
+            <a:extLst>
+              <a:ext uri="{FF2B5EF4-FFF2-40B4-BE49-F238E27FC236}">
+                <a16:creationId xmlns:a16="http://schemas.microsoft.com/office/drawing/2014/main" id="{06E4902B-35A8-4ADA-BE93-F8A791DA8BDC}"/>
+              </a:ext>
+            </a:extLst>
+          </p:cNvPr>
+          <p:cNvSpPr txBox="1"/>
+          <p:nvPr/>
+        </p:nvSpPr>
+        <p:spPr>
+          <a:xfrm>
+            <a:off x="9126514" y="4478159"/>
+            <a:ext cx="857927" cy="523220"/>
+          </a:xfrm>
+          <a:prstGeom prst="rect">
+            <a:avLst/>
+          </a:prstGeom>
+          <a:noFill/>
+        </p:spPr>
+        <p:txBody>
+          <a:bodyPr wrap="none" rtlCol="0">
+            <a:spAutoFit/>
+          </a:bodyPr>
+          <a:lstStyle/>
+          <a:p>
+            <a:pPr algn="ctr"/>
+            <a:r>
+              <a:rPr lang="pt-BR" sz="1400" dirty="0" err="1">
+                <a:latin typeface="Tahoma" panose="020B0604030504040204" pitchFamily="34" charset="0"/>
+                <a:ea typeface="Tahoma" panose="020B0604030504040204" pitchFamily="34" charset="0"/>
+                <a:cs typeface="Tahoma" panose="020B0604030504040204" pitchFamily="34" charset="0"/>
+              </a:rPr>
+              <a:t>Step</a:t>
+            </a:r>
+            <a:endParaRPr lang="pt-BR" sz="1400" dirty="0">
+              <a:latin typeface="Tahoma" panose="020B0604030504040204" pitchFamily="34" charset="0"/>
+              <a:ea typeface="Tahoma" panose="020B0604030504040204" pitchFamily="34" charset="0"/>
+              <a:cs typeface="Tahoma" panose="020B0604030504040204" pitchFamily="34" charset="0"/>
+            </a:endParaRPr>
+          </a:p>
+          <a:p>
+            <a:pPr algn="ctr"/>
+            <a:r>
+              <a:rPr lang="pt-BR" sz="1400" dirty="0" err="1">
+                <a:latin typeface="Tahoma" panose="020B0604030504040204" pitchFamily="34" charset="0"/>
+                <a:ea typeface="Tahoma" panose="020B0604030504040204" pitchFamily="34" charset="0"/>
+                <a:cs typeface="Tahoma" panose="020B0604030504040204" pitchFamily="34" charset="0"/>
+              </a:rPr>
+              <a:t>Function</a:t>
+            </a:r>
+            <a:endParaRPr lang="pt-BR" sz="1400" dirty="0">
+              <a:latin typeface="Tahoma" panose="020B0604030504040204" pitchFamily="34" charset="0"/>
+              <a:ea typeface="Tahoma" panose="020B0604030504040204" pitchFamily="34" charset="0"/>
+              <a:cs typeface="Tahoma" panose="020B0604030504040204" pitchFamily="34" charset="0"/>
+            </a:endParaRPr>
+          </a:p>
+        </p:txBody>
+      </p:sp>
+      <p:sp>
+        <p:nvSpPr>
+          <p:cNvPr id="21" name="Retângulo 20">
+            <a:extLst>
+              <a:ext uri="{FF2B5EF4-FFF2-40B4-BE49-F238E27FC236}">
+                <a16:creationId xmlns:a16="http://schemas.microsoft.com/office/drawing/2014/main" id="{3C8FA7D4-EE8E-45FD-81C8-0317BF69C29F}"/>
+              </a:ext>
+            </a:extLst>
+          </p:cNvPr>
+          <p:cNvSpPr/>
+          <p:nvPr/>
+        </p:nvSpPr>
+        <p:spPr>
+          <a:xfrm>
+            <a:off x="7788492" y="5175673"/>
+            <a:ext cx="3314937" cy="738664"/>
+          </a:xfrm>
+          <a:prstGeom prst="rect">
+            <a:avLst/>
+          </a:prstGeom>
+          <a:solidFill>
+            <a:srgbClr val="FFFFFF"/>
+          </a:solidFill>
+          <a:ln>
+            <a:noFill/>
+          </a:ln>
+        </p:spPr>
+        <p:style>
+          <a:lnRef idx="2">
+            <a:schemeClr val="accent1">
+              <a:shade val="50000"/>
+            </a:schemeClr>
+          </a:lnRef>
+          <a:fillRef idx="1">
+            <a:schemeClr val="accent1"/>
+          </a:fillRef>
+          <a:effectRef idx="0">
+            <a:schemeClr val="accent1"/>
+          </a:effectRef>
+          <a:fontRef idx="minor">
+            <a:schemeClr val="lt1"/>
+          </a:fontRef>
+        </p:style>
+        <p:txBody>
+          <a:bodyPr rtlCol="0" anchor="ctr"/>
+          <a:lstStyle/>
+          <a:p>
+            <a:pPr algn="ctr"/>
+            <a:endParaRPr lang="pt-BR"/>
+          </a:p>
+        </p:txBody>
+      </p:sp>
+      <p:sp>
+        <p:nvSpPr>
+          <p:cNvPr id="22" name="Retângulo 21">
+            <a:extLst>
+              <a:ext uri="{FF2B5EF4-FFF2-40B4-BE49-F238E27FC236}">
+                <a16:creationId xmlns:a16="http://schemas.microsoft.com/office/drawing/2014/main" id="{F67C5A76-5AC3-40A2-AD90-7F66116D25FD}"/>
+              </a:ext>
+            </a:extLst>
+          </p:cNvPr>
+          <p:cNvSpPr/>
+          <p:nvPr/>
+        </p:nvSpPr>
+        <p:spPr>
+          <a:xfrm rot="20862935">
+            <a:off x="4173105" y="2317447"/>
+            <a:ext cx="857927" cy="523220"/>
+          </a:xfrm>
+          <a:prstGeom prst="rect">
+            <a:avLst/>
+          </a:prstGeom>
+          <a:solidFill>
+            <a:srgbClr val="FFFFFF"/>
+          </a:solidFill>
+          <a:ln>
+            <a:noFill/>
+          </a:ln>
+        </p:spPr>
+        <p:style>
+          <a:lnRef idx="2">
+            <a:schemeClr val="accent1">
+              <a:shade val="50000"/>
+            </a:schemeClr>
+          </a:lnRef>
+          <a:fillRef idx="1">
+            <a:schemeClr val="accent1"/>
+          </a:fillRef>
+          <a:effectRef idx="0">
+            <a:schemeClr val="accent1"/>
+          </a:effectRef>
+          <a:fontRef idx="minor">
+            <a:schemeClr val="lt1"/>
+          </a:fontRef>
+        </p:style>
+        <p:txBody>
+          <a:bodyPr rtlCol="0" anchor="ctr"/>
+          <a:lstStyle/>
+          <a:p>
+            <a:pPr algn="ctr"/>
+            <a:endParaRPr lang="pt-BR"/>
+          </a:p>
+        </p:txBody>
+      </p:sp>
+      <p:sp>
+        <p:nvSpPr>
+          <p:cNvPr id="13" name="CaixaDeTexto 12">
+            <a:extLst>
+              <a:ext uri="{FF2B5EF4-FFF2-40B4-BE49-F238E27FC236}">
+                <a16:creationId xmlns:a16="http://schemas.microsoft.com/office/drawing/2014/main" id="{004BACBB-636E-47CB-AF45-2C43A3FF1366}"/>
+              </a:ext>
+            </a:extLst>
+          </p:cNvPr>
+          <p:cNvSpPr txBox="1"/>
+          <p:nvPr/>
+        </p:nvSpPr>
+        <p:spPr>
+          <a:xfrm>
+            <a:off x="3826584" y="2327668"/>
+            <a:ext cx="892617" cy="369332"/>
+          </a:xfrm>
+          <a:prstGeom prst="rect">
+            <a:avLst/>
+          </a:prstGeom>
+          <a:noFill/>
+        </p:spPr>
+        <p:txBody>
+          <a:bodyPr wrap="none" rtlCol="0">
+            <a:spAutoFit/>
+          </a:bodyPr>
+          <a:lstStyle/>
+          <a:p>
+            <a:r>
+              <a:rPr lang="pt-BR" dirty="0" err="1">
+                <a:latin typeface="Tahoma" panose="020B0604030504040204" pitchFamily="34" charset="0"/>
+                <a:ea typeface="Tahoma" panose="020B0604030504040204" pitchFamily="34" charset="0"/>
+                <a:cs typeface="Tahoma" panose="020B0604030504040204" pitchFamily="34" charset="0"/>
+              </a:rPr>
+              <a:t>Weight</a:t>
+            </a:r>
+            <a:endParaRPr lang="pt-BR" dirty="0">
+              <a:latin typeface="Tahoma" panose="020B0604030504040204" pitchFamily="34" charset="0"/>
+              <a:ea typeface="Tahoma" panose="020B0604030504040204" pitchFamily="34" charset="0"/>
+              <a:cs typeface="Tahoma" panose="020B0604030504040204" pitchFamily="34" charset="0"/>
+            </a:endParaRPr>
+          </a:p>
+        </p:txBody>
+      </p:sp>
+      <p:sp>
+        <p:nvSpPr>
+          <p:cNvPr id="23" name="CaixaDeTexto 22">
+            <a:extLst>
+              <a:ext uri="{FF2B5EF4-FFF2-40B4-BE49-F238E27FC236}">
+                <a16:creationId xmlns:a16="http://schemas.microsoft.com/office/drawing/2014/main" id="{E30968D0-9524-47BF-A595-562639A35ACA}"/>
+              </a:ext>
+            </a:extLst>
+          </p:cNvPr>
+          <p:cNvSpPr txBox="1"/>
+          <p:nvPr/>
+        </p:nvSpPr>
+        <p:spPr>
+          <a:xfrm>
+            <a:off x="7377546" y="2761978"/>
+            <a:ext cx="892617" cy="369332"/>
+          </a:xfrm>
+          <a:prstGeom prst="rect">
+            <a:avLst/>
+          </a:prstGeom>
+          <a:noFill/>
+        </p:spPr>
+        <p:txBody>
+          <a:bodyPr wrap="none" rtlCol="0">
+            <a:spAutoFit/>
+          </a:bodyPr>
+          <a:lstStyle/>
+          <a:p>
+            <a:r>
+              <a:rPr lang="pt-BR" dirty="0" err="1">
+                <a:latin typeface="Tahoma" panose="020B0604030504040204" pitchFamily="34" charset="0"/>
+                <a:ea typeface="Tahoma" panose="020B0604030504040204" pitchFamily="34" charset="0"/>
+                <a:cs typeface="Tahoma" panose="020B0604030504040204" pitchFamily="34" charset="0"/>
+              </a:rPr>
+              <a:t>Weight</a:t>
+            </a:r>
+            <a:endParaRPr lang="pt-BR" dirty="0">
+              <a:latin typeface="Tahoma" panose="020B0604030504040204" pitchFamily="34" charset="0"/>
+              <a:ea typeface="Tahoma" panose="020B0604030504040204" pitchFamily="34" charset="0"/>
+              <a:cs typeface="Tahoma" panose="020B0604030504040204" pitchFamily="34" charset="0"/>
+            </a:endParaRPr>
+          </a:p>
+        </p:txBody>
+      </p:sp>
+      <p:sp>
+        <p:nvSpPr>
+          <p:cNvPr id="24" name="Retângulo 23">
+            <a:extLst>
+              <a:ext uri="{FF2B5EF4-FFF2-40B4-BE49-F238E27FC236}">
+                <a16:creationId xmlns:a16="http://schemas.microsoft.com/office/drawing/2014/main" id="{CFAE1C5D-5F0E-4211-85D3-E9F324729F61}"/>
+              </a:ext>
+            </a:extLst>
+          </p:cNvPr>
+          <p:cNvSpPr/>
+          <p:nvPr/>
+        </p:nvSpPr>
+        <p:spPr>
+          <a:xfrm>
+            <a:off x="5390065" y="1391539"/>
+            <a:ext cx="3314937" cy="738664"/>
+          </a:xfrm>
+          <a:prstGeom prst="rect">
+            <a:avLst/>
+          </a:prstGeom>
+          <a:solidFill>
+            <a:srgbClr val="FFFFFF"/>
+          </a:solidFill>
+          <a:ln>
+            <a:noFill/>
+          </a:ln>
+        </p:spPr>
+        <p:style>
+          <a:lnRef idx="2">
+            <a:schemeClr val="accent1">
+              <a:shade val="50000"/>
+            </a:schemeClr>
+          </a:lnRef>
+          <a:fillRef idx="1">
+            <a:schemeClr val="accent1"/>
+          </a:fillRef>
+          <a:effectRef idx="0">
+            <a:schemeClr val="accent1"/>
+          </a:effectRef>
+          <a:fontRef idx="minor">
+            <a:schemeClr val="lt1"/>
+          </a:fontRef>
+        </p:style>
+        <p:txBody>
+          <a:bodyPr rtlCol="0" anchor="ctr"/>
+          <a:lstStyle/>
+          <a:p>
+            <a:pPr algn="ctr"/>
+            <a:endParaRPr lang="pt-BR"/>
+          </a:p>
+        </p:txBody>
+      </p:sp>
+      <p:sp>
+        <p:nvSpPr>
+          <p:cNvPr id="25" name="CaixaDeTexto 24">
+            <a:extLst>
+              <a:ext uri="{FF2B5EF4-FFF2-40B4-BE49-F238E27FC236}">
+                <a16:creationId xmlns:a16="http://schemas.microsoft.com/office/drawing/2014/main" id="{FD269EBF-27B3-4C2C-9BBF-F76C2BD4347A}"/>
+              </a:ext>
+            </a:extLst>
+          </p:cNvPr>
+          <p:cNvSpPr txBox="1"/>
+          <p:nvPr/>
+        </p:nvSpPr>
+        <p:spPr>
+          <a:xfrm>
+            <a:off x="5672512" y="1667286"/>
+            <a:ext cx="1526187" cy="369332"/>
+          </a:xfrm>
+          <a:prstGeom prst="rect">
+            <a:avLst/>
+          </a:prstGeom>
+          <a:noFill/>
+        </p:spPr>
+        <p:txBody>
+          <a:bodyPr wrap="none" rtlCol="0">
+            <a:spAutoFit/>
+          </a:bodyPr>
+          <a:lstStyle/>
+          <a:p>
+            <a:r>
+              <a:rPr lang="pt-BR" dirty="0" err="1">
+                <a:latin typeface="Tahoma" panose="020B0604030504040204" pitchFamily="34" charset="0"/>
+                <a:ea typeface="Tahoma" panose="020B0604030504040204" pitchFamily="34" charset="0"/>
+                <a:cs typeface="Tahoma" panose="020B0604030504040204" pitchFamily="34" charset="0"/>
+              </a:rPr>
+              <a:t>Hidden</a:t>
+            </a:r>
+            <a:r>
+              <a:rPr lang="pt-BR" dirty="0">
+                <a:latin typeface="Tahoma" panose="020B0604030504040204" pitchFamily="34" charset="0"/>
+                <a:ea typeface="Tahoma" panose="020B0604030504040204" pitchFamily="34" charset="0"/>
+                <a:cs typeface="Tahoma" panose="020B0604030504040204" pitchFamily="34" charset="0"/>
+              </a:rPr>
+              <a:t> </a:t>
+            </a:r>
+            <a:r>
+              <a:rPr lang="pt-BR" dirty="0" err="1">
+                <a:latin typeface="Tahoma" panose="020B0604030504040204" pitchFamily="34" charset="0"/>
+                <a:ea typeface="Tahoma" panose="020B0604030504040204" pitchFamily="34" charset="0"/>
+                <a:cs typeface="Tahoma" panose="020B0604030504040204" pitchFamily="34" charset="0"/>
+              </a:rPr>
+              <a:t>Layer</a:t>
+            </a:r>
+            <a:endParaRPr lang="pt-BR" dirty="0">
+              <a:latin typeface="Tahoma" panose="020B0604030504040204" pitchFamily="34" charset="0"/>
+              <a:ea typeface="Tahoma" panose="020B0604030504040204" pitchFamily="34" charset="0"/>
+              <a:cs typeface="Tahoma" panose="020B0604030504040204" pitchFamily="34" charset="0"/>
+            </a:endParaRPr>
+          </a:p>
+        </p:txBody>
+      </p:sp>
+      <p:sp>
+        <p:nvSpPr>
+          <p:cNvPr id="4" name="Retângulo 3">
+            <a:extLst>
+              <a:ext uri="{FF2B5EF4-FFF2-40B4-BE49-F238E27FC236}">
+                <a16:creationId xmlns:a16="http://schemas.microsoft.com/office/drawing/2014/main" id="{8E0D7681-0C96-4FA9-A0CC-2B978A5EB96D}"/>
+              </a:ext>
+            </a:extLst>
+          </p:cNvPr>
+          <p:cNvSpPr/>
+          <p:nvPr/>
+        </p:nvSpPr>
+        <p:spPr>
+          <a:xfrm>
+            <a:off x="0" y="0"/>
+            <a:ext cx="12192000" cy="1371600"/>
+          </a:xfrm>
+          <a:prstGeom prst="rect">
+            <a:avLst/>
+          </a:prstGeom>
+          <a:solidFill>
+            <a:srgbClr val="05CB71"/>
+          </a:solidFill>
+        </p:spPr>
+        <p:style>
+          <a:lnRef idx="2">
+            <a:schemeClr val="accent1">
+              <a:shade val="50000"/>
+            </a:schemeClr>
+          </a:lnRef>
+          <a:fillRef idx="1">
+            <a:schemeClr val="accent1"/>
+          </a:fillRef>
+          <a:effectRef idx="0">
+            <a:schemeClr val="accent1"/>
+          </a:effectRef>
+          <a:fontRef idx="minor">
+            <a:schemeClr val="lt1"/>
+          </a:fontRef>
+        </p:style>
+        <p:txBody>
+          <a:bodyPr rtlCol="0" anchor="ctr"/>
+          <a:lstStyle/>
+          <a:p>
+            <a:pPr algn="ctr"/>
+            <a:r>
+              <a:rPr lang="pt-BR" sz="6600" b="1" dirty="0">
+                <a:effectLst>
+                  <a:outerShdw blurRad="38100" dist="38100" dir="2700000" algn="tl">
+                    <a:srgbClr val="000000">
+                      <a:alpha val="43137"/>
+                    </a:srgbClr>
+                  </a:outerShdw>
+                </a:effectLst>
+                <a:latin typeface="Tahoma" panose="020B0604030504040204" pitchFamily="34" charset="0"/>
+                <a:ea typeface="Tahoma" panose="020B0604030504040204" pitchFamily="34" charset="0"/>
+                <a:cs typeface="Tahoma" panose="020B0604030504040204" pitchFamily="34" charset="0"/>
+              </a:rPr>
+              <a:t>Artificial Neural Networks</a:t>
+            </a:r>
+          </a:p>
+        </p:txBody>
+      </p:sp>
+    </p:spTree>
+    <p:extLst>
+      <p:ext uri="{BB962C8B-B14F-4D97-AF65-F5344CB8AC3E}">
+        <p14:creationId xmlns:p14="http://schemas.microsoft.com/office/powerpoint/2010/main" val="2670530355"/>
+      </p:ext>
+    </p:extLst>
+  </p:cSld>
+  <p:clrMapOvr>
+    <a:masterClrMapping/>
+  </p:clrMapOvr>
+</p:sld>
+</file>
+
 <file path=ppt/theme/theme1.xml><?xml version="1.0" encoding="utf-8"?>
 <a:theme xmlns:a="http://schemas.openxmlformats.org/drawingml/2006/main" name="Tema do Office">
   <a:themeElements>

</xml_diff>

<commit_message>
update neural networks - 8
</commit_message>
<xml_diff>
--- a/_Neural_Networks/Neural_Networks - Projeto.pptx
+++ b/_Neural_Networks/Neural_Networks - Projeto.pptx
@@ -11,6 +11,7 @@
     <p:sldId id="261" r:id="rId5"/>
     <p:sldId id="262" r:id="rId6"/>
     <p:sldId id="263" r:id="rId7"/>
+    <p:sldId id="264" r:id="rId8"/>
   </p:sldIdLst>
   <p:sldSz cx="12192000" cy="6858000"/>
   <p:notesSz cx="6858000" cy="9144000"/>
@@ -6801,6 +6802,351 @@
 </p:sld>
 </file>
 
+<file path=ppt/slides/slide7.xml><?xml version="1.0" encoding="utf-8"?>
+<p:sld xmlns:a="http://schemas.openxmlformats.org/drawingml/2006/main" xmlns:r="http://schemas.openxmlformats.org/officeDocument/2006/relationships" xmlns:p="http://schemas.openxmlformats.org/presentationml/2006/main">
+  <p:cSld>
+    <p:spTree>
+      <p:nvGrpSpPr>
+        <p:cNvPr id="1" name=""/>
+        <p:cNvGrpSpPr/>
+        <p:nvPr/>
+      </p:nvGrpSpPr>
+      <p:grpSpPr>
+        <a:xfrm>
+          <a:off x="0" y="0"/>
+          <a:ext cx="0" cy="0"/>
+          <a:chOff x="0" y="0"/>
+          <a:chExt cx="0" cy="0"/>
+        </a:xfrm>
+      </p:grpSpPr>
+      <p:pic>
+        <p:nvPicPr>
+          <p:cNvPr id="3" name="Imagem 2">
+            <a:extLst>
+              <a:ext uri="{FF2B5EF4-FFF2-40B4-BE49-F238E27FC236}">
+                <a16:creationId xmlns:a16="http://schemas.microsoft.com/office/drawing/2014/main" id="{AFD1A43B-7390-47E5-A3C2-2A4530E38F64}"/>
+              </a:ext>
+            </a:extLst>
+          </p:cNvPr>
+          <p:cNvPicPr>
+            <a:picLocks noChangeAspect="1"/>
+          </p:cNvPicPr>
+          <p:nvPr/>
+        </p:nvPicPr>
+        <p:blipFill>
+          <a:blip r:embed="rId2"/>
+          <a:stretch>
+            <a:fillRect/>
+          </a:stretch>
+        </p:blipFill>
+        <p:spPr>
+          <a:xfrm>
+            <a:off x="-45489" y="1203630"/>
+            <a:ext cx="12192000" cy="5492300"/>
+          </a:xfrm>
+          <a:prstGeom prst="rect">
+            <a:avLst/>
+          </a:prstGeom>
+        </p:spPr>
+      </p:pic>
+      <p:sp>
+        <p:nvSpPr>
+          <p:cNvPr id="6" name="Retângulo 5">
+            <a:extLst>
+              <a:ext uri="{FF2B5EF4-FFF2-40B4-BE49-F238E27FC236}">
+                <a16:creationId xmlns:a16="http://schemas.microsoft.com/office/drawing/2014/main" id="{A527B96A-284F-4F40-B01E-F6A7CCF2D7F0}"/>
+              </a:ext>
+            </a:extLst>
+          </p:cNvPr>
+          <p:cNvSpPr/>
+          <p:nvPr/>
+        </p:nvSpPr>
+        <p:spPr>
+          <a:xfrm>
+            <a:off x="-360742" y="1839588"/>
+            <a:ext cx="983672" cy="649046"/>
+          </a:xfrm>
+          <a:prstGeom prst="rect">
+            <a:avLst/>
+          </a:prstGeom>
+          <a:solidFill>
+            <a:srgbClr val="FFFFFF"/>
+          </a:solidFill>
+          <a:ln>
+            <a:noFill/>
+          </a:ln>
+        </p:spPr>
+        <p:style>
+          <a:lnRef idx="2">
+            <a:schemeClr val="accent1">
+              <a:shade val="50000"/>
+            </a:schemeClr>
+          </a:lnRef>
+          <a:fillRef idx="1">
+            <a:schemeClr val="accent1"/>
+          </a:fillRef>
+          <a:effectRef idx="0">
+            <a:schemeClr val="accent1"/>
+          </a:effectRef>
+          <a:fontRef idx="minor">
+            <a:schemeClr val="lt1"/>
+          </a:fontRef>
+        </p:style>
+        <p:txBody>
+          <a:bodyPr rtlCol="0" anchor="ctr"/>
+          <a:lstStyle/>
+          <a:p>
+            <a:pPr algn="ctr"/>
+            <a:endParaRPr lang="pt-BR"/>
+          </a:p>
+        </p:txBody>
+      </p:sp>
+      <p:sp>
+        <p:nvSpPr>
+          <p:cNvPr id="10" name="Retângulo 9">
+            <a:extLst>
+              <a:ext uri="{FF2B5EF4-FFF2-40B4-BE49-F238E27FC236}">
+                <a16:creationId xmlns:a16="http://schemas.microsoft.com/office/drawing/2014/main" id="{F9094FD0-18F3-4E25-9C30-548510639E00}"/>
+              </a:ext>
+            </a:extLst>
+          </p:cNvPr>
+          <p:cNvSpPr/>
+          <p:nvPr/>
+        </p:nvSpPr>
+        <p:spPr>
+          <a:xfrm>
+            <a:off x="744390" y="1576601"/>
+            <a:ext cx="2566845" cy="440165"/>
+          </a:xfrm>
+          <a:prstGeom prst="rect">
+            <a:avLst/>
+          </a:prstGeom>
+          <a:solidFill>
+            <a:srgbClr val="FFFFFF"/>
+          </a:solidFill>
+          <a:ln>
+            <a:noFill/>
+          </a:ln>
+        </p:spPr>
+        <p:style>
+          <a:lnRef idx="2">
+            <a:schemeClr val="accent1">
+              <a:shade val="50000"/>
+            </a:schemeClr>
+          </a:lnRef>
+          <a:fillRef idx="1">
+            <a:schemeClr val="accent1"/>
+          </a:fillRef>
+          <a:effectRef idx="0">
+            <a:schemeClr val="accent1"/>
+          </a:effectRef>
+          <a:fontRef idx="minor">
+            <a:schemeClr val="lt1"/>
+          </a:fontRef>
+        </p:style>
+        <p:txBody>
+          <a:bodyPr rtlCol="0" anchor="ctr"/>
+          <a:lstStyle/>
+          <a:p>
+            <a:pPr algn="ctr"/>
+            <a:endParaRPr lang="pt-BR"/>
+          </a:p>
+        </p:txBody>
+      </p:sp>
+      <p:sp>
+        <p:nvSpPr>
+          <p:cNvPr id="17" name="Retângulo 16">
+            <a:extLst>
+              <a:ext uri="{FF2B5EF4-FFF2-40B4-BE49-F238E27FC236}">
+                <a16:creationId xmlns:a16="http://schemas.microsoft.com/office/drawing/2014/main" id="{4AA26FFD-C9E7-4CB4-9E7F-F34D0691E611}"/>
+              </a:ext>
+            </a:extLst>
+          </p:cNvPr>
+          <p:cNvSpPr/>
+          <p:nvPr/>
+        </p:nvSpPr>
+        <p:spPr>
+          <a:xfrm>
+            <a:off x="131094" y="3089107"/>
+            <a:ext cx="4486567" cy="856346"/>
+          </a:xfrm>
+          <a:prstGeom prst="rect">
+            <a:avLst/>
+          </a:prstGeom>
+          <a:solidFill>
+            <a:srgbClr val="FFFFFF"/>
+          </a:solidFill>
+          <a:ln>
+            <a:noFill/>
+          </a:ln>
+        </p:spPr>
+        <p:style>
+          <a:lnRef idx="2">
+            <a:schemeClr val="accent1">
+              <a:shade val="50000"/>
+            </a:schemeClr>
+          </a:lnRef>
+          <a:fillRef idx="1">
+            <a:schemeClr val="accent1"/>
+          </a:fillRef>
+          <a:effectRef idx="0">
+            <a:schemeClr val="accent1"/>
+          </a:effectRef>
+          <a:fontRef idx="minor">
+            <a:schemeClr val="lt1"/>
+          </a:fontRef>
+        </p:style>
+        <p:txBody>
+          <a:bodyPr rtlCol="0" anchor="ctr"/>
+          <a:lstStyle/>
+          <a:p>
+            <a:pPr algn="ctr"/>
+            <a:endParaRPr lang="pt-BR"/>
+          </a:p>
+        </p:txBody>
+      </p:sp>
+      <p:sp>
+        <p:nvSpPr>
+          <p:cNvPr id="4" name="Retângulo 3">
+            <a:extLst>
+              <a:ext uri="{FF2B5EF4-FFF2-40B4-BE49-F238E27FC236}">
+                <a16:creationId xmlns:a16="http://schemas.microsoft.com/office/drawing/2014/main" id="{8E0D7681-0C96-4FA9-A0CC-2B978A5EB96D}"/>
+              </a:ext>
+            </a:extLst>
+          </p:cNvPr>
+          <p:cNvSpPr/>
+          <p:nvPr/>
+        </p:nvSpPr>
+        <p:spPr>
+          <a:xfrm>
+            <a:off x="0" y="0"/>
+            <a:ext cx="12192000" cy="1371600"/>
+          </a:xfrm>
+          <a:prstGeom prst="rect">
+            <a:avLst/>
+          </a:prstGeom>
+          <a:solidFill>
+            <a:srgbClr val="05CB71"/>
+          </a:solidFill>
+        </p:spPr>
+        <p:style>
+          <a:lnRef idx="2">
+            <a:schemeClr val="accent1">
+              <a:shade val="50000"/>
+            </a:schemeClr>
+          </a:lnRef>
+          <a:fillRef idx="1">
+            <a:schemeClr val="accent1"/>
+          </a:fillRef>
+          <a:effectRef idx="0">
+            <a:schemeClr val="accent1"/>
+          </a:effectRef>
+          <a:fontRef idx="minor">
+            <a:schemeClr val="lt1"/>
+          </a:fontRef>
+        </p:style>
+        <p:txBody>
+          <a:bodyPr rtlCol="0" anchor="ctr"/>
+          <a:lstStyle/>
+          <a:p>
+            <a:pPr algn="ctr"/>
+            <a:r>
+              <a:rPr lang="pt-BR" sz="6600" b="1" dirty="0">
+                <a:effectLst>
+                  <a:outerShdw blurRad="38100" dist="38100" dir="2700000" algn="tl">
+                    <a:srgbClr val="000000">
+                      <a:alpha val="43137"/>
+                    </a:srgbClr>
+                  </a:outerShdw>
+                </a:effectLst>
+                <a:latin typeface="Tahoma" panose="020B0604030504040204" pitchFamily="34" charset="0"/>
+                <a:ea typeface="Tahoma" panose="020B0604030504040204" pitchFamily="34" charset="0"/>
+                <a:cs typeface="Tahoma" panose="020B0604030504040204" pitchFamily="34" charset="0"/>
+              </a:rPr>
+              <a:t>Artificial Neural Networks</a:t>
+            </a:r>
+          </a:p>
+        </p:txBody>
+      </p:sp>
+      <p:sp>
+        <p:nvSpPr>
+          <p:cNvPr id="5" name="CaixaDeTexto 4">
+            <a:extLst>
+              <a:ext uri="{FF2B5EF4-FFF2-40B4-BE49-F238E27FC236}">
+                <a16:creationId xmlns:a16="http://schemas.microsoft.com/office/drawing/2014/main" id="{EBF0E6F4-C1FB-4813-8FC0-943108E5F4AD}"/>
+              </a:ext>
+            </a:extLst>
+          </p:cNvPr>
+          <p:cNvSpPr txBox="1"/>
+          <p:nvPr/>
+        </p:nvSpPr>
+        <p:spPr>
+          <a:xfrm>
+            <a:off x="400028" y="1505398"/>
+            <a:ext cx="2975495" cy="523220"/>
+          </a:xfrm>
+          <a:prstGeom prst="rect">
+            <a:avLst/>
+          </a:prstGeom>
+          <a:noFill/>
+        </p:spPr>
+        <p:txBody>
+          <a:bodyPr wrap="none" rtlCol="0">
+            <a:spAutoFit/>
+          </a:bodyPr>
+          <a:lstStyle/>
+          <a:p>
+            <a:r>
+              <a:rPr lang="pt-BR" sz="2800" b="1" i="0" dirty="0" err="1">
+                <a:solidFill>
+                  <a:srgbClr val="4A4A4A"/>
+                </a:solidFill>
+                <a:effectLst/>
+                <a:latin typeface="Roboto" panose="02000000000000000000" pitchFamily="2" charset="0"/>
+              </a:rPr>
+              <a:t>Gradient</a:t>
+            </a:r>
+            <a:r>
+              <a:rPr lang="pt-BR" sz="2800" b="1" i="0" dirty="0">
+                <a:solidFill>
+                  <a:srgbClr val="4A4A4A"/>
+                </a:solidFill>
+                <a:effectLst/>
+                <a:latin typeface="Roboto" panose="02000000000000000000" pitchFamily="2" charset="0"/>
+              </a:rPr>
+              <a:t> </a:t>
+            </a:r>
+            <a:r>
+              <a:rPr lang="pt-BR" sz="2800" b="1" i="0" dirty="0" err="1">
+                <a:solidFill>
+                  <a:srgbClr val="4A4A4A"/>
+                </a:solidFill>
+                <a:effectLst/>
+                <a:latin typeface="Roboto" panose="02000000000000000000" pitchFamily="2" charset="0"/>
+              </a:rPr>
+              <a:t>Descent</a:t>
+            </a:r>
+            <a:endParaRPr lang="pt-BR" sz="2800" b="1" dirty="0">
+              <a:latin typeface="Tahoma" panose="020B0604030504040204" pitchFamily="34" charset="0"/>
+              <a:ea typeface="Tahoma" panose="020B0604030504040204" pitchFamily="34" charset="0"/>
+              <a:cs typeface="Tahoma" panose="020B0604030504040204" pitchFamily="34" charset="0"/>
+            </a:endParaRPr>
+          </a:p>
+        </p:txBody>
+      </p:sp>
+    </p:spTree>
+    <p:extLst>
+      <p:ext uri="{BB962C8B-B14F-4D97-AF65-F5344CB8AC3E}">
+        <p14:creationId xmlns:p14="http://schemas.microsoft.com/office/powerpoint/2010/main" val="216842163"/>
+      </p:ext>
+    </p:extLst>
+  </p:cSld>
+  <p:clrMapOvr>
+    <a:masterClrMapping/>
+  </p:clrMapOvr>
+</p:sld>
+</file>
+
 <file path=ppt/theme/theme1.xml><?xml version="1.0" encoding="utf-8"?>
 <a:theme xmlns:a="http://schemas.openxmlformats.org/drawingml/2006/main" name="Tema do Office">
   <a:themeElements>

</xml_diff>